<commit_message>
Adding schedule, the pdfs for the first 2 lectures + changes to the basic summary lecture.
</commit_message>
<xml_diff>
--- a/1 Java Basics summary.pptx
+++ b/1 Java Basics summary.pptx
@@ -27,6 +27,8 @@
     <p:sldId id="272" r:id="rId24"/>
     <p:sldId id="273" r:id="rId25"/>
     <p:sldId id="274" r:id="rId26"/>
+    <p:sldId id="275" r:id="rId27"/>
+    <p:sldId id="276" r:id="rId28"/>
   </p:sldIdLst>
   <p:sldSz cx="13004800" cy="9753600"/>
   <p:notesSz cx="6858000" cy="9144000"/>
@@ -81,13 +83,13 @@
         </a:solidFill>
         <a:effectLst/>
         <a:uFillTx/>
-        <a:latin typeface="+mn-lt"/>
-        <a:ea typeface="+mn-ea"/>
-        <a:cs typeface="+mn-cs"/>
-        <a:sym typeface="Helvetica Light"/>
+        <a:latin typeface="+mj-lt"/>
+        <a:ea typeface="+mj-ea"/>
+        <a:cs typeface="+mj-cs"/>
+        <a:sym typeface="Helvetica Neue"/>
       </a:defRPr>
     </a:lvl1pPr>
-    <a:lvl2pPr marL="0" marR="0" indent="228600" algn="ctr" defTabSz="584200" rtl="0" fontAlgn="auto" latinLnBrk="0" hangingPunct="0">
+    <a:lvl2pPr marL="0" marR="0" indent="0" algn="ctr" defTabSz="584200" rtl="0" fontAlgn="auto" latinLnBrk="0" hangingPunct="0">
       <a:lnSpc>
         <a:spcPct val="100000"/>
       </a:lnSpc>
@@ -111,13 +113,13 @@
         </a:solidFill>
         <a:effectLst/>
         <a:uFillTx/>
-        <a:latin typeface="+mn-lt"/>
-        <a:ea typeface="+mn-ea"/>
-        <a:cs typeface="+mn-cs"/>
-        <a:sym typeface="Helvetica Light"/>
+        <a:latin typeface="+mj-lt"/>
+        <a:ea typeface="+mj-ea"/>
+        <a:cs typeface="+mj-cs"/>
+        <a:sym typeface="Helvetica Neue"/>
       </a:defRPr>
     </a:lvl2pPr>
-    <a:lvl3pPr marL="0" marR="0" indent="457200" algn="ctr" defTabSz="584200" rtl="0" fontAlgn="auto" latinLnBrk="0" hangingPunct="0">
+    <a:lvl3pPr marL="0" marR="0" indent="0" algn="ctr" defTabSz="584200" rtl="0" fontAlgn="auto" latinLnBrk="0" hangingPunct="0">
       <a:lnSpc>
         <a:spcPct val="100000"/>
       </a:lnSpc>
@@ -141,13 +143,13 @@
         </a:solidFill>
         <a:effectLst/>
         <a:uFillTx/>
-        <a:latin typeface="+mn-lt"/>
-        <a:ea typeface="+mn-ea"/>
-        <a:cs typeface="+mn-cs"/>
-        <a:sym typeface="Helvetica Light"/>
+        <a:latin typeface="+mj-lt"/>
+        <a:ea typeface="+mj-ea"/>
+        <a:cs typeface="+mj-cs"/>
+        <a:sym typeface="Helvetica Neue"/>
       </a:defRPr>
     </a:lvl3pPr>
-    <a:lvl4pPr marL="0" marR="0" indent="685800" algn="ctr" defTabSz="584200" rtl="0" fontAlgn="auto" latinLnBrk="0" hangingPunct="0">
+    <a:lvl4pPr marL="0" marR="0" indent="0" algn="ctr" defTabSz="584200" rtl="0" fontAlgn="auto" latinLnBrk="0" hangingPunct="0">
       <a:lnSpc>
         <a:spcPct val="100000"/>
       </a:lnSpc>
@@ -171,13 +173,13 @@
         </a:solidFill>
         <a:effectLst/>
         <a:uFillTx/>
-        <a:latin typeface="+mn-lt"/>
-        <a:ea typeface="+mn-ea"/>
-        <a:cs typeface="+mn-cs"/>
-        <a:sym typeface="Helvetica Light"/>
+        <a:latin typeface="+mj-lt"/>
+        <a:ea typeface="+mj-ea"/>
+        <a:cs typeface="+mj-cs"/>
+        <a:sym typeface="Helvetica Neue"/>
       </a:defRPr>
     </a:lvl4pPr>
-    <a:lvl5pPr marL="0" marR="0" indent="914400" algn="ctr" defTabSz="584200" rtl="0" fontAlgn="auto" latinLnBrk="0" hangingPunct="0">
+    <a:lvl5pPr marL="0" marR="0" indent="0" algn="ctr" defTabSz="584200" rtl="0" fontAlgn="auto" latinLnBrk="0" hangingPunct="0">
       <a:lnSpc>
         <a:spcPct val="100000"/>
       </a:lnSpc>
@@ -201,13 +203,13 @@
         </a:solidFill>
         <a:effectLst/>
         <a:uFillTx/>
-        <a:latin typeface="+mn-lt"/>
-        <a:ea typeface="+mn-ea"/>
-        <a:cs typeface="+mn-cs"/>
-        <a:sym typeface="Helvetica Light"/>
+        <a:latin typeface="+mj-lt"/>
+        <a:ea typeface="+mj-ea"/>
+        <a:cs typeface="+mj-cs"/>
+        <a:sym typeface="Helvetica Neue"/>
       </a:defRPr>
     </a:lvl5pPr>
-    <a:lvl6pPr marL="0" marR="0" indent="1143000" algn="ctr" defTabSz="584200" rtl="0" fontAlgn="auto" latinLnBrk="0" hangingPunct="0">
+    <a:lvl6pPr marL="0" marR="0" indent="0" algn="ctr" defTabSz="584200" rtl="0" fontAlgn="auto" latinLnBrk="0" hangingPunct="0">
       <a:lnSpc>
         <a:spcPct val="100000"/>
       </a:lnSpc>
@@ -231,13 +233,13 @@
         </a:solidFill>
         <a:effectLst/>
         <a:uFillTx/>
-        <a:latin typeface="+mn-lt"/>
-        <a:ea typeface="+mn-ea"/>
-        <a:cs typeface="+mn-cs"/>
-        <a:sym typeface="Helvetica Light"/>
+        <a:latin typeface="+mj-lt"/>
+        <a:ea typeface="+mj-ea"/>
+        <a:cs typeface="+mj-cs"/>
+        <a:sym typeface="Helvetica Neue"/>
       </a:defRPr>
     </a:lvl6pPr>
-    <a:lvl7pPr marL="0" marR="0" indent="1371600" algn="ctr" defTabSz="584200" rtl="0" fontAlgn="auto" latinLnBrk="0" hangingPunct="0">
+    <a:lvl7pPr marL="0" marR="0" indent="0" algn="ctr" defTabSz="584200" rtl="0" fontAlgn="auto" latinLnBrk="0" hangingPunct="0">
       <a:lnSpc>
         <a:spcPct val="100000"/>
       </a:lnSpc>
@@ -261,13 +263,13 @@
         </a:solidFill>
         <a:effectLst/>
         <a:uFillTx/>
-        <a:latin typeface="+mn-lt"/>
-        <a:ea typeface="+mn-ea"/>
-        <a:cs typeface="+mn-cs"/>
-        <a:sym typeface="Helvetica Light"/>
+        <a:latin typeface="+mj-lt"/>
+        <a:ea typeface="+mj-ea"/>
+        <a:cs typeface="+mj-cs"/>
+        <a:sym typeface="Helvetica Neue"/>
       </a:defRPr>
     </a:lvl7pPr>
-    <a:lvl8pPr marL="0" marR="0" indent="1600200" algn="ctr" defTabSz="584200" rtl="0" fontAlgn="auto" latinLnBrk="0" hangingPunct="0">
+    <a:lvl8pPr marL="0" marR="0" indent="0" algn="ctr" defTabSz="584200" rtl="0" fontAlgn="auto" latinLnBrk="0" hangingPunct="0">
       <a:lnSpc>
         <a:spcPct val="100000"/>
       </a:lnSpc>
@@ -291,13 +293,13 @@
         </a:solidFill>
         <a:effectLst/>
         <a:uFillTx/>
-        <a:latin typeface="+mn-lt"/>
-        <a:ea typeface="+mn-ea"/>
-        <a:cs typeface="+mn-cs"/>
-        <a:sym typeface="Helvetica Light"/>
+        <a:latin typeface="+mj-lt"/>
+        <a:ea typeface="+mj-ea"/>
+        <a:cs typeface="+mj-cs"/>
+        <a:sym typeface="Helvetica Neue"/>
       </a:defRPr>
     </a:lvl8pPr>
-    <a:lvl9pPr marL="0" marR="0" indent="1828800" algn="ctr" defTabSz="584200" rtl="0" fontAlgn="auto" latinLnBrk="0" hangingPunct="0">
+    <a:lvl9pPr marL="0" marR="0" indent="0" algn="ctr" defTabSz="584200" rtl="0" fontAlgn="auto" latinLnBrk="0" hangingPunct="0">
       <a:lnSpc>
         <a:spcPct val="100000"/>
       </a:lnSpc>
@@ -321,10 +323,10 @@
         </a:solidFill>
         <a:effectLst/>
         <a:uFillTx/>
-        <a:latin typeface="+mn-lt"/>
-        <a:ea typeface="+mn-ea"/>
-        <a:cs typeface="+mn-cs"/>
-        <a:sym typeface="Helvetica Light"/>
+        <a:latin typeface="+mj-lt"/>
+        <a:ea typeface="+mj-ea"/>
+        <a:cs typeface="+mj-cs"/>
+        <a:sym typeface="Helvetica Neue"/>
       </a:defRPr>
     </a:lvl9pPr>
   </p:defaultTextStyle>
@@ -411,9 +413,9 @@
         <a:spcPct val="117999"/>
       </a:lnSpc>
       <a:defRPr sz="2200">
-        <a:latin typeface="Helvetica Neue"/>
-        <a:ea typeface="Helvetica Neue"/>
-        <a:cs typeface="Helvetica Neue"/>
+        <a:latin typeface="+mj-lt"/>
+        <a:ea typeface="+mj-ea"/>
+        <a:cs typeface="+mj-cs"/>
         <a:sym typeface="Helvetica Neue"/>
       </a:defRPr>
     </a:lvl1pPr>
@@ -422,9 +424,9 @@
         <a:spcPct val="117999"/>
       </a:lnSpc>
       <a:defRPr sz="2200">
-        <a:latin typeface="Helvetica Neue"/>
-        <a:ea typeface="Helvetica Neue"/>
-        <a:cs typeface="Helvetica Neue"/>
+        <a:latin typeface="+mj-lt"/>
+        <a:ea typeface="+mj-ea"/>
+        <a:cs typeface="+mj-cs"/>
         <a:sym typeface="Helvetica Neue"/>
       </a:defRPr>
     </a:lvl2pPr>
@@ -433,9 +435,9 @@
         <a:spcPct val="117999"/>
       </a:lnSpc>
       <a:defRPr sz="2200">
-        <a:latin typeface="Helvetica Neue"/>
-        <a:ea typeface="Helvetica Neue"/>
-        <a:cs typeface="Helvetica Neue"/>
+        <a:latin typeface="+mj-lt"/>
+        <a:ea typeface="+mj-ea"/>
+        <a:cs typeface="+mj-cs"/>
         <a:sym typeface="Helvetica Neue"/>
       </a:defRPr>
     </a:lvl3pPr>
@@ -444,9 +446,9 @@
         <a:spcPct val="117999"/>
       </a:lnSpc>
       <a:defRPr sz="2200">
-        <a:latin typeface="Helvetica Neue"/>
-        <a:ea typeface="Helvetica Neue"/>
-        <a:cs typeface="Helvetica Neue"/>
+        <a:latin typeface="+mj-lt"/>
+        <a:ea typeface="+mj-ea"/>
+        <a:cs typeface="+mj-cs"/>
         <a:sym typeface="Helvetica Neue"/>
       </a:defRPr>
     </a:lvl4pPr>
@@ -455,9 +457,9 @@
         <a:spcPct val="117999"/>
       </a:lnSpc>
       <a:defRPr sz="2200">
-        <a:latin typeface="Helvetica Neue"/>
-        <a:ea typeface="Helvetica Neue"/>
-        <a:cs typeface="Helvetica Neue"/>
+        <a:latin typeface="+mj-lt"/>
+        <a:ea typeface="+mj-ea"/>
+        <a:cs typeface="+mj-cs"/>
         <a:sym typeface="Helvetica Neue"/>
       </a:defRPr>
     </a:lvl5pPr>
@@ -466,9 +468,9 @@
         <a:spcPct val="117999"/>
       </a:lnSpc>
       <a:defRPr sz="2200">
-        <a:latin typeface="Helvetica Neue"/>
-        <a:ea typeface="Helvetica Neue"/>
-        <a:cs typeface="Helvetica Neue"/>
+        <a:latin typeface="+mj-lt"/>
+        <a:ea typeface="+mj-ea"/>
+        <a:cs typeface="+mj-cs"/>
         <a:sym typeface="Helvetica Neue"/>
       </a:defRPr>
     </a:lvl6pPr>
@@ -477,9 +479,9 @@
         <a:spcPct val="117999"/>
       </a:lnSpc>
       <a:defRPr sz="2200">
-        <a:latin typeface="Helvetica Neue"/>
-        <a:ea typeface="Helvetica Neue"/>
-        <a:cs typeface="Helvetica Neue"/>
+        <a:latin typeface="+mj-lt"/>
+        <a:ea typeface="+mj-ea"/>
+        <a:cs typeface="+mj-cs"/>
         <a:sym typeface="Helvetica Neue"/>
       </a:defRPr>
     </a:lvl7pPr>
@@ -488,9 +490,9 @@
         <a:spcPct val="117999"/>
       </a:lnSpc>
       <a:defRPr sz="2200">
-        <a:latin typeface="Helvetica Neue"/>
-        <a:ea typeface="Helvetica Neue"/>
-        <a:cs typeface="Helvetica Neue"/>
+        <a:latin typeface="+mj-lt"/>
+        <a:ea typeface="+mj-ea"/>
+        <a:cs typeface="+mj-cs"/>
         <a:sym typeface="Helvetica Neue"/>
       </a:defRPr>
     </a:lvl8pPr>
@@ -499,9 +501,9 @@
         <a:spcPct val="117999"/>
       </a:lnSpc>
       <a:defRPr sz="2200">
-        <a:latin typeface="Helvetica Neue"/>
-        <a:ea typeface="Helvetica Neue"/>
-        <a:cs typeface="Helvetica Neue"/>
+        <a:latin typeface="+mj-lt"/>
+        <a:ea typeface="+mj-ea"/>
+        <a:cs typeface="+mj-cs"/>
         <a:sym typeface="Helvetica Neue"/>
       </a:defRPr>
     </a:lvl9pPr>
@@ -582,7 +584,7 @@
               <a:buNone/>
               <a:defRPr sz="3200"/>
             </a:lvl1pPr>
-            <a:lvl2pPr marL="0" indent="228600" algn="ctr">
+            <a:lvl2pPr marL="0" indent="0" algn="ctr">
               <a:spcBef>
                 <a:spcPts val="0"/>
               </a:spcBef>
@@ -590,7 +592,7 @@
               <a:buNone/>
               <a:defRPr sz="3200"/>
             </a:lvl2pPr>
-            <a:lvl3pPr marL="0" indent="457200" algn="ctr">
+            <a:lvl3pPr marL="0" indent="0" algn="ctr">
               <a:spcBef>
                 <a:spcPts val="0"/>
               </a:spcBef>
@@ -598,7 +600,7 @@
               <a:buNone/>
               <a:defRPr sz="3200"/>
             </a:lvl3pPr>
-            <a:lvl4pPr marL="0" indent="685800" algn="ctr">
+            <a:lvl4pPr marL="0" indent="0" algn="ctr">
               <a:spcBef>
                 <a:spcPts val="0"/>
               </a:spcBef>
@@ -606,7 +608,7 @@
               <a:buNone/>
               <a:defRPr sz="3200"/>
             </a:lvl4pPr>
-            <a:lvl5pPr marL="0" indent="914400" algn="ctr">
+            <a:lvl5pPr marL="0" indent="0" algn="ctr">
               <a:spcBef>
                 <a:spcPts val="0"/>
               </a:spcBef>
@@ -700,7 +702,7 @@
           <p:cNvPr id="93" name="Shape 93"/>
           <p:cNvSpPr/>
           <p:nvPr>
-            <p:ph type="body" sz="quarter" idx="13"/>
+            <p:ph type="body" sz="quarter" idx="1"/>
           </p:nvPr>
         </p:nvSpPr>
         <p:spPr>
@@ -713,9 +715,7 @@
           </a:prstGeom>
         </p:spPr>
         <p:txBody>
-          <a:bodyPr anchor="t">
-            <a:spAutoFit/>
-          </a:bodyPr>
+          <a:bodyPr anchor="t"/>
           <a:lstStyle>
             <a:lvl1pPr marL="0" indent="0" algn="ctr">
               <a:spcBef>
@@ -739,7 +739,7 @@
           <p:cNvPr id="94" name="Shape 94"/>
           <p:cNvSpPr/>
           <p:nvPr>
-            <p:ph type="body" sz="quarter" idx="14"/>
+            <p:ph type="body" sz="quarter" idx="13"/>
           </p:nvPr>
         </p:nvSpPr>
         <p:spPr>
@@ -752,24 +752,10 @@
           </a:prstGeom>
         </p:spPr>
         <p:txBody>
-          <a:bodyPr>
-            <a:spAutoFit/>
-          </a:bodyPr>
-          <a:lstStyle>
-            <a:lvl1pPr marL="0" indent="0" algn="ctr">
-              <a:spcBef>
-                <a:spcPts val="0"/>
-              </a:spcBef>
-              <a:buSzTx/>
-              <a:buNone/>
-              <a:defRPr sz="3800"/>
-            </a:lvl1pPr>
-          </a:lstStyle>
+          <a:bodyPr/>
+          <a:lstStyle/>
           <a:p>
             <a:pPr/>
-            <a:r>
-              <a:t>“Type a quote here.” </a:t>
-            </a:r>
           </a:p>
         </p:txBody>
       </p:sp>
@@ -1027,7 +1013,7 @@
               <a:buNone/>
               <a:defRPr sz="3200"/>
             </a:lvl1pPr>
-            <a:lvl2pPr marL="0" indent="228600" algn="ctr">
+            <a:lvl2pPr marL="0" indent="0" algn="ctr">
               <a:spcBef>
                 <a:spcPts val="0"/>
               </a:spcBef>
@@ -1035,7 +1021,7 @@
               <a:buNone/>
               <a:defRPr sz="3200"/>
             </a:lvl2pPr>
-            <a:lvl3pPr marL="0" indent="457200" algn="ctr">
+            <a:lvl3pPr marL="0" indent="0" algn="ctr">
               <a:spcBef>
                 <a:spcPts val="0"/>
               </a:spcBef>
@@ -1043,7 +1029,7 @@
               <a:buNone/>
               <a:defRPr sz="3200"/>
             </a:lvl3pPr>
-            <a:lvl4pPr marL="0" indent="685800" algn="ctr">
+            <a:lvl4pPr marL="0" indent="0" algn="ctr">
               <a:spcBef>
                 <a:spcPts val="0"/>
               </a:spcBef>
@@ -1051,7 +1037,7 @@
               <a:buNone/>
               <a:defRPr sz="3200"/>
             </a:lvl4pPr>
-            <a:lvl5pPr marL="0" indent="914400" algn="ctr">
+            <a:lvl5pPr marL="0" indent="0" algn="ctr">
               <a:spcBef>
                 <a:spcPts val="0"/>
               </a:spcBef>
@@ -1307,7 +1293,7 @@
               <a:buNone/>
               <a:defRPr sz="3200"/>
             </a:lvl1pPr>
-            <a:lvl2pPr marL="0" indent="228600" algn="ctr">
+            <a:lvl2pPr marL="0" indent="0" algn="ctr">
               <a:spcBef>
                 <a:spcPts val="0"/>
               </a:spcBef>
@@ -1315,7 +1301,7 @@
               <a:buNone/>
               <a:defRPr sz="3200"/>
             </a:lvl2pPr>
-            <a:lvl3pPr marL="0" indent="457200" algn="ctr">
+            <a:lvl3pPr marL="0" indent="0" algn="ctr">
               <a:spcBef>
                 <a:spcPts val="0"/>
               </a:spcBef>
@@ -1323,7 +1309,7 @@
               <a:buNone/>
               <a:defRPr sz="3200"/>
             </a:lvl3pPr>
-            <a:lvl4pPr marL="0" indent="685800" algn="ctr">
+            <a:lvl4pPr marL="0" indent="0" algn="ctr">
               <a:spcBef>
                 <a:spcPts val="0"/>
               </a:spcBef>
@@ -1331,7 +1317,7 @@
               <a:buNone/>
               <a:defRPr sz="3200"/>
             </a:lvl4pPr>
-            <a:lvl5pPr marL="0" indent="914400" algn="ctr">
+            <a:lvl5pPr marL="0" indent="0" algn="ctr">
               <a:spcBef>
                 <a:spcPts val="0"/>
               </a:spcBef>
@@ -1932,7 +1918,7 @@
         <p:spPr>
           <a:xfrm>
             <a:off x="6724518" y="889000"/>
-            <a:ext cx="5334001" cy="3771900"/>
+            <a:ext cx="5334003" cy="3771900"/>
           </a:xfrm>
           <a:prstGeom prst="rect">
             <a:avLst/>
@@ -2156,7 +2142,12 @@
           </a:bodyPr>
           <a:lstStyle>
             <a:lvl1pPr>
-              <a:defRPr sz="1800"/>
+              <a:defRPr sz="1800">
+                <a:latin typeface="Helvetica Light"/>
+                <a:ea typeface="Helvetica Light"/>
+                <a:cs typeface="Helvetica Light"/>
+                <a:sym typeface="Helvetica Light"/>
+              </a:defRPr>
             </a:lvl1pPr>
           </a:lstStyle>
           <a:p>
@@ -2208,13 +2199,13 @@
             <a:srgbClr val="000000"/>
           </a:solidFill>
           <a:uFillTx/>
-          <a:latin typeface="+mn-lt"/>
-          <a:ea typeface="+mn-ea"/>
-          <a:cs typeface="+mn-cs"/>
+          <a:latin typeface="Helvetica Light"/>
+          <a:ea typeface="Helvetica Light"/>
+          <a:cs typeface="Helvetica Light"/>
           <a:sym typeface="Helvetica Light"/>
         </a:defRPr>
       </a:lvl1pPr>
-      <a:lvl2pPr marL="0" marR="0" indent="228600" algn="ctr" defTabSz="584200" rtl="0" latinLnBrk="0">
+      <a:lvl2pPr marL="0" marR="0" indent="0" algn="ctr" defTabSz="584200" rtl="0" latinLnBrk="0">
         <a:lnSpc>
           <a:spcPct val="100000"/>
         </a:lnSpc>
@@ -2237,13 +2228,13 @@
             <a:srgbClr val="000000"/>
           </a:solidFill>
           <a:uFillTx/>
-          <a:latin typeface="+mn-lt"/>
-          <a:ea typeface="+mn-ea"/>
-          <a:cs typeface="+mn-cs"/>
+          <a:latin typeface="Helvetica Light"/>
+          <a:ea typeface="Helvetica Light"/>
+          <a:cs typeface="Helvetica Light"/>
           <a:sym typeface="Helvetica Light"/>
         </a:defRPr>
       </a:lvl2pPr>
-      <a:lvl3pPr marL="0" marR="0" indent="457200" algn="ctr" defTabSz="584200" rtl="0" latinLnBrk="0">
+      <a:lvl3pPr marL="0" marR="0" indent="0" algn="ctr" defTabSz="584200" rtl="0" latinLnBrk="0">
         <a:lnSpc>
           <a:spcPct val="100000"/>
         </a:lnSpc>
@@ -2266,13 +2257,13 @@
             <a:srgbClr val="000000"/>
           </a:solidFill>
           <a:uFillTx/>
-          <a:latin typeface="+mn-lt"/>
-          <a:ea typeface="+mn-ea"/>
-          <a:cs typeface="+mn-cs"/>
+          <a:latin typeface="Helvetica Light"/>
+          <a:ea typeface="Helvetica Light"/>
+          <a:cs typeface="Helvetica Light"/>
           <a:sym typeface="Helvetica Light"/>
         </a:defRPr>
       </a:lvl3pPr>
-      <a:lvl4pPr marL="0" marR="0" indent="685800" algn="ctr" defTabSz="584200" rtl="0" latinLnBrk="0">
+      <a:lvl4pPr marL="0" marR="0" indent="0" algn="ctr" defTabSz="584200" rtl="0" latinLnBrk="0">
         <a:lnSpc>
           <a:spcPct val="100000"/>
         </a:lnSpc>
@@ -2295,13 +2286,13 @@
             <a:srgbClr val="000000"/>
           </a:solidFill>
           <a:uFillTx/>
-          <a:latin typeface="+mn-lt"/>
-          <a:ea typeface="+mn-ea"/>
-          <a:cs typeface="+mn-cs"/>
+          <a:latin typeface="Helvetica Light"/>
+          <a:ea typeface="Helvetica Light"/>
+          <a:cs typeface="Helvetica Light"/>
           <a:sym typeface="Helvetica Light"/>
         </a:defRPr>
       </a:lvl4pPr>
-      <a:lvl5pPr marL="0" marR="0" indent="914400" algn="ctr" defTabSz="584200" rtl="0" latinLnBrk="0">
+      <a:lvl5pPr marL="0" marR="0" indent="0" algn="ctr" defTabSz="584200" rtl="0" latinLnBrk="0">
         <a:lnSpc>
           <a:spcPct val="100000"/>
         </a:lnSpc>
@@ -2324,13 +2315,13 @@
             <a:srgbClr val="000000"/>
           </a:solidFill>
           <a:uFillTx/>
-          <a:latin typeface="+mn-lt"/>
-          <a:ea typeface="+mn-ea"/>
-          <a:cs typeface="+mn-cs"/>
+          <a:latin typeface="Helvetica Light"/>
+          <a:ea typeface="Helvetica Light"/>
+          <a:cs typeface="Helvetica Light"/>
           <a:sym typeface="Helvetica Light"/>
         </a:defRPr>
       </a:lvl5pPr>
-      <a:lvl6pPr marL="0" marR="0" indent="1143000" algn="ctr" defTabSz="584200" rtl="0" latinLnBrk="0">
+      <a:lvl6pPr marL="0" marR="0" indent="0" algn="ctr" defTabSz="584200" rtl="0" latinLnBrk="0">
         <a:lnSpc>
           <a:spcPct val="100000"/>
         </a:lnSpc>
@@ -2353,13 +2344,13 @@
             <a:srgbClr val="000000"/>
           </a:solidFill>
           <a:uFillTx/>
-          <a:latin typeface="+mn-lt"/>
-          <a:ea typeface="+mn-ea"/>
-          <a:cs typeface="+mn-cs"/>
+          <a:latin typeface="Helvetica Light"/>
+          <a:ea typeface="Helvetica Light"/>
+          <a:cs typeface="Helvetica Light"/>
           <a:sym typeface="Helvetica Light"/>
         </a:defRPr>
       </a:lvl6pPr>
-      <a:lvl7pPr marL="0" marR="0" indent="1371600" algn="ctr" defTabSz="584200" rtl="0" latinLnBrk="0">
+      <a:lvl7pPr marL="0" marR="0" indent="0" algn="ctr" defTabSz="584200" rtl="0" latinLnBrk="0">
         <a:lnSpc>
           <a:spcPct val="100000"/>
         </a:lnSpc>
@@ -2382,13 +2373,13 @@
             <a:srgbClr val="000000"/>
           </a:solidFill>
           <a:uFillTx/>
-          <a:latin typeface="+mn-lt"/>
-          <a:ea typeface="+mn-ea"/>
-          <a:cs typeface="+mn-cs"/>
+          <a:latin typeface="Helvetica Light"/>
+          <a:ea typeface="Helvetica Light"/>
+          <a:cs typeface="Helvetica Light"/>
           <a:sym typeface="Helvetica Light"/>
         </a:defRPr>
       </a:lvl7pPr>
-      <a:lvl8pPr marL="0" marR="0" indent="1600200" algn="ctr" defTabSz="584200" rtl="0" latinLnBrk="0">
+      <a:lvl8pPr marL="0" marR="0" indent="0" algn="ctr" defTabSz="584200" rtl="0" latinLnBrk="0">
         <a:lnSpc>
           <a:spcPct val="100000"/>
         </a:lnSpc>
@@ -2411,13 +2402,13 @@
             <a:srgbClr val="000000"/>
           </a:solidFill>
           <a:uFillTx/>
-          <a:latin typeface="+mn-lt"/>
-          <a:ea typeface="+mn-ea"/>
-          <a:cs typeface="+mn-cs"/>
+          <a:latin typeface="Helvetica Light"/>
+          <a:ea typeface="Helvetica Light"/>
+          <a:cs typeface="Helvetica Light"/>
           <a:sym typeface="Helvetica Light"/>
         </a:defRPr>
       </a:lvl8pPr>
-      <a:lvl9pPr marL="0" marR="0" indent="1828800" algn="ctr" defTabSz="584200" rtl="0" latinLnBrk="0">
+      <a:lvl9pPr marL="0" marR="0" indent="0" algn="ctr" defTabSz="584200" rtl="0" latinLnBrk="0">
         <a:lnSpc>
           <a:spcPct val="100000"/>
         </a:lnSpc>
@@ -2440,9 +2431,9 @@
             <a:srgbClr val="000000"/>
           </a:solidFill>
           <a:uFillTx/>
-          <a:latin typeface="+mn-lt"/>
-          <a:ea typeface="+mn-ea"/>
-          <a:cs typeface="+mn-cs"/>
+          <a:latin typeface="Helvetica Light"/>
+          <a:ea typeface="Helvetica Light"/>
+          <a:cs typeface="Helvetica Light"/>
           <a:sym typeface="Helvetica Light"/>
         </a:defRPr>
       </a:lvl9pPr>
@@ -2471,9 +2462,9 @@
             <a:srgbClr val="000000"/>
           </a:solidFill>
           <a:uFillTx/>
-          <a:latin typeface="+mn-lt"/>
-          <a:ea typeface="+mn-ea"/>
-          <a:cs typeface="+mn-cs"/>
+          <a:latin typeface="Helvetica Light"/>
+          <a:ea typeface="Helvetica Light"/>
+          <a:cs typeface="Helvetica Light"/>
           <a:sym typeface="Helvetica Light"/>
         </a:defRPr>
       </a:lvl1pPr>
@@ -2500,9 +2491,9 @@
             <a:srgbClr val="000000"/>
           </a:solidFill>
           <a:uFillTx/>
-          <a:latin typeface="+mn-lt"/>
-          <a:ea typeface="+mn-ea"/>
-          <a:cs typeface="+mn-cs"/>
+          <a:latin typeface="Helvetica Light"/>
+          <a:ea typeface="Helvetica Light"/>
+          <a:cs typeface="Helvetica Light"/>
           <a:sym typeface="Helvetica Light"/>
         </a:defRPr>
       </a:lvl2pPr>
@@ -2529,9 +2520,9 @@
             <a:srgbClr val="000000"/>
           </a:solidFill>
           <a:uFillTx/>
-          <a:latin typeface="+mn-lt"/>
-          <a:ea typeface="+mn-ea"/>
-          <a:cs typeface="+mn-cs"/>
+          <a:latin typeface="Helvetica Light"/>
+          <a:ea typeface="Helvetica Light"/>
+          <a:cs typeface="Helvetica Light"/>
           <a:sym typeface="Helvetica Light"/>
         </a:defRPr>
       </a:lvl3pPr>
@@ -2558,9 +2549,9 @@
             <a:srgbClr val="000000"/>
           </a:solidFill>
           <a:uFillTx/>
-          <a:latin typeface="+mn-lt"/>
-          <a:ea typeface="+mn-ea"/>
-          <a:cs typeface="+mn-cs"/>
+          <a:latin typeface="Helvetica Light"/>
+          <a:ea typeface="Helvetica Light"/>
+          <a:cs typeface="Helvetica Light"/>
           <a:sym typeface="Helvetica Light"/>
         </a:defRPr>
       </a:lvl4pPr>
@@ -2587,9 +2578,9 @@
             <a:srgbClr val="000000"/>
           </a:solidFill>
           <a:uFillTx/>
-          <a:latin typeface="+mn-lt"/>
-          <a:ea typeface="+mn-ea"/>
-          <a:cs typeface="+mn-cs"/>
+          <a:latin typeface="Helvetica Light"/>
+          <a:ea typeface="Helvetica Light"/>
+          <a:cs typeface="Helvetica Light"/>
           <a:sym typeface="Helvetica Light"/>
         </a:defRPr>
       </a:lvl5pPr>
@@ -2616,9 +2607,9 @@
             <a:srgbClr val="000000"/>
           </a:solidFill>
           <a:uFillTx/>
-          <a:latin typeface="+mn-lt"/>
-          <a:ea typeface="+mn-ea"/>
-          <a:cs typeface="+mn-cs"/>
+          <a:latin typeface="Helvetica Light"/>
+          <a:ea typeface="Helvetica Light"/>
+          <a:cs typeface="Helvetica Light"/>
           <a:sym typeface="Helvetica Light"/>
         </a:defRPr>
       </a:lvl6pPr>
@@ -2645,9 +2636,9 @@
             <a:srgbClr val="000000"/>
           </a:solidFill>
           <a:uFillTx/>
-          <a:latin typeface="+mn-lt"/>
-          <a:ea typeface="+mn-ea"/>
-          <a:cs typeface="+mn-cs"/>
+          <a:latin typeface="Helvetica Light"/>
+          <a:ea typeface="Helvetica Light"/>
+          <a:cs typeface="Helvetica Light"/>
           <a:sym typeface="Helvetica Light"/>
         </a:defRPr>
       </a:lvl7pPr>
@@ -2674,9 +2665,9 @@
             <a:srgbClr val="000000"/>
           </a:solidFill>
           <a:uFillTx/>
-          <a:latin typeface="+mn-lt"/>
-          <a:ea typeface="+mn-ea"/>
-          <a:cs typeface="+mn-cs"/>
+          <a:latin typeface="Helvetica Light"/>
+          <a:ea typeface="Helvetica Light"/>
+          <a:cs typeface="Helvetica Light"/>
           <a:sym typeface="Helvetica Light"/>
         </a:defRPr>
       </a:lvl8pPr>
@@ -2703,9 +2694,9 @@
             <a:srgbClr val="000000"/>
           </a:solidFill>
           <a:uFillTx/>
-          <a:latin typeface="+mn-lt"/>
-          <a:ea typeface="+mn-ea"/>
-          <a:cs typeface="+mn-cs"/>
+          <a:latin typeface="Helvetica Light"/>
+          <a:ea typeface="Helvetica Light"/>
+          <a:cs typeface="Helvetica Light"/>
           <a:sym typeface="Helvetica Light"/>
         </a:defRPr>
       </a:lvl9pPr>
@@ -2740,7 +2731,7 @@
           <a:sym typeface="Helvetica Light"/>
         </a:defRPr>
       </a:lvl1pPr>
-      <a:lvl2pPr marL="0" marR="0" indent="228600" algn="ctr" defTabSz="584200" rtl="0" latinLnBrk="0">
+      <a:lvl2pPr marL="0" marR="0" indent="0" algn="ctr" defTabSz="584200" rtl="0" latinLnBrk="0">
         <a:lnSpc>
           <a:spcPct val="100000"/>
         </a:lnSpc>
@@ -2769,7 +2760,7 @@
           <a:sym typeface="Helvetica Light"/>
         </a:defRPr>
       </a:lvl2pPr>
-      <a:lvl3pPr marL="0" marR="0" indent="457200" algn="ctr" defTabSz="584200" rtl="0" latinLnBrk="0">
+      <a:lvl3pPr marL="0" marR="0" indent="0" algn="ctr" defTabSz="584200" rtl="0" latinLnBrk="0">
         <a:lnSpc>
           <a:spcPct val="100000"/>
         </a:lnSpc>
@@ -2798,7 +2789,7 @@
           <a:sym typeface="Helvetica Light"/>
         </a:defRPr>
       </a:lvl3pPr>
-      <a:lvl4pPr marL="0" marR="0" indent="685800" algn="ctr" defTabSz="584200" rtl="0" latinLnBrk="0">
+      <a:lvl4pPr marL="0" marR="0" indent="0" algn="ctr" defTabSz="584200" rtl="0" latinLnBrk="0">
         <a:lnSpc>
           <a:spcPct val="100000"/>
         </a:lnSpc>
@@ -2827,7 +2818,7 @@
           <a:sym typeface="Helvetica Light"/>
         </a:defRPr>
       </a:lvl4pPr>
-      <a:lvl5pPr marL="0" marR="0" indent="914400" algn="ctr" defTabSz="584200" rtl="0" latinLnBrk="0">
+      <a:lvl5pPr marL="0" marR="0" indent="0" algn="ctr" defTabSz="584200" rtl="0" latinLnBrk="0">
         <a:lnSpc>
           <a:spcPct val="100000"/>
         </a:lnSpc>
@@ -2856,7 +2847,7 @@
           <a:sym typeface="Helvetica Light"/>
         </a:defRPr>
       </a:lvl5pPr>
-      <a:lvl6pPr marL="0" marR="0" indent="1143000" algn="ctr" defTabSz="584200" rtl="0" latinLnBrk="0">
+      <a:lvl6pPr marL="0" marR="0" indent="0" algn="ctr" defTabSz="584200" rtl="0" latinLnBrk="0">
         <a:lnSpc>
           <a:spcPct val="100000"/>
         </a:lnSpc>
@@ -2885,7 +2876,7 @@
           <a:sym typeface="Helvetica Light"/>
         </a:defRPr>
       </a:lvl6pPr>
-      <a:lvl7pPr marL="0" marR="0" indent="1371600" algn="ctr" defTabSz="584200" rtl="0" latinLnBrk="0">
+      <a:lvl7pPr marL="0" marR="0" indent="0" algn="ctr" defTabSz="584200" rtl="0" latinLnBrk="0">
         <a:lnSpc>
           <a:spcPct val="100000"/>
         </a:lnSpc>
@@ -2914,7 +2905,7 @@
           <a:sym typeface="Helvetica Light"/>
         </a:defRPr>
       </a:lvl7pPr>
-      <a:lvl8pPr marL="0" marR="0" indent="1600200" algn="ctr" defTabSz="584200" rtl="0" latinLnBrk="0">
+      <a:lvl8pPr marL="0" marR="0" indent="0" algn="ctr" defTabSz="584200" rtl="0" latinLnBrk="0">
         <a:lnSpc>
           <a:spcPct val="100000"/>
         </a:lnSpc>
@@ -2943,7 +2934,7 @@
           <a:sym typeface="Helvetica Light"/>
         </a:defRPr>
       </a:lvl8pPr>
-      <a:lvl9pPr marL="0" marR="0" indent="1828800" algn="ctr" defTabSz="584200" rtl="0" latinLnBrk="0">
+      <a:lvl9pPr marL="0" marR="0" indent="0" algn="ctr" defTabSz="584200" rtl="0" latinLnBrk="0">
         <a:lnSpc>
           <a:spcPct val="100000"/>
         </a:lnSpc>
@@ -3084,7 +3075,7 @@
           <a:p>
             <a:pPr/>
             <a:r>
-              <a:t>Loops</a:t>
+              <a:t>Arrays</a:t>
             </a:r>
           </a:p>
         </p:txBody>
@@ -3107,9 +3098,6 @@
           <a:lstStyle/>
           <a:p>
             <a:pPr/>
-            <a:r>
-              <a:t>For, do while, while, *”for each”</a:t>
-            </a:r>
           </a:p>
         </p:txBody>
       </p:sp>
@@ -3158,7 +3146,7 @@
           <a:p>
             <a:pPr/>
             <a:r>
-              <a:t>Break &amp; Continue</a:t>
+              <a:t>Loops</a:t>
             </a:r>
           </a:p>
         </p:txBody>
@@ -3181,6 +3169,9 @@
           <a:lstStyle/>
           <a:p>
             <a:pPr/>
+            <a:r>
+              <a:t>For, do while, while, *”for each”</a:t>
+            </a:r>
           </a:p>
         </p:txBody>
       </p:sp>
@@ -3229,7 +3220,7 @@
           <a:p>
             <a:pPr/>
             <a:r>
-              <a:t>Strings</a:t>
+              <a:t>Break &amp; Continue</a:t>
             </a:r>
           </a:p>
         </p:txBody>
@@ -3296,20 +3287,11 @@
         </p:spPr>
         <p:txBody>
           <a:bodyPr/>
-          <a:lstStyle>
-            <a:lvl1pPr defTabSz="490727">
-              <a:defRPr b="1" sz="6719">
-                <a:latin typeface="Helvetica"/>
-                <a:ea typeface="Helvetica"/>
-                <a:cs typeface="Helvetica"/>
-                <a:sym typeface="Helvetica"/>
-              </a:defRPr>
-            </a:lvl1pPr>
-          </a:lstStyle>
+          <a:lstStyle/>
           <a:p>
             <a:pPr/>
             <a:r>
-              <a:t>Object oriented programming</a:t>
+              <a:t>Strings</a:t>
             </a:r>
           </a:p>
         </p:txBody>
@@ -3331,180 +3313,7 @@
           <a:bodyPr/>
           <a:lstStyle/>
           <a:p>
-            <a:pPr marL="240030" indent="-240030" defTabSz="315468">
-              <a:spcBef>
-                <a:spcPts val="2200"/>
-              </a:spcBef>
-              <a:defRPr b="1" sz="1944">
-                <a:latin typeface="Helvetica"/>
-                <a:ea typeface="Helvetica"/>
-                <a:cs typeface="Helvetica"/>
-                <a:sym typeface="Helvetica"/>
-              </a:defRPr>
-            </a:pPr>
-            <a:r>
-              <a:t>Classes</a:t>
-            </a:r>
-          </a:p>
-          <a:p>
-            <a:pPr marL="240030" indent="-240030" defTabSz="315468">
-              <a:spcBef>
-                <a:spcPts val="2200"/>
-              </a:spcBef>
-              <a:defRPr b="1" sz="1944">
-                <a:latin typeface="Helvetica"/>
-                <a:ea typeface="Helvetica"/>
-                <a:cs typeface="Helvetica"/>
-                <a:sym typeface="Helvetica"/>
-              </a:defRPr>
-            </a:pPr>
-            <a:r>
-              <a:t>Fields</a:t>
-            </a:r>
-          </a:p>
-          <a:p>
-            <a:pPr marL="240030" indent="-240030" defTabSz="315468">
-              <a:spcBef>
-                <a:spcPts val="2200"/>
-              </a:spcBef>
-              <a:defRPr b="1" sz="1944">
-                <a:latin typeface="Helvetica"/>
-                <a:ea typeface="Helvetica"/>
-                <a:cs typeface="Helvetica"/>
-                <a:sym typeface="Helvetica"/>
-              </a:defRPr>
-            </a:pPr>
-            <a:r>
-              <a:t>Methods</a:t>
-            </a:r>
-          </a:p>
-          <a:p>
-            <a:pPr marL="240030" indent="-240030" defTabSz="315468">
-              <a:spcBef>
-                <a:spcPts val="2200"/>
-              </a:spcBef>
-              <a:defRPr b="1" sz="1944">
-                <a:latin typeface="Helvetica"/>
-                <a:ea typeface="Helvetica"/>
-                <a:cs typeface="Helvetica"/>
-                <a:sym typeface="Helvetica"/>
-              </a:defRPr>
-            </a:pPr>
-            <a:r>
-              <a:t>Constructors</a:t>
-            </a:r>
-          </a:p>
-          <a:p>
-            <a:pPr marL="240030" indent="-240030" defTabSz="315468">
-              <a:spcBef>
-                <a:spcPts val="2200"/>
-              </a:spcBef>
-              <a:defRPr b="1" sz="1944">
-                <a:latin typeface="Helvetica"/>
-                <a:ea typeface="Helvetica"/>
-                <a:cs typeface="Helvetica"/>
-                <a:sym typeface="Helvetica"/>
-              </a:defRPr>
-            </a:pPr>
-            <a:r>
-              <a:t>Static members</a:t>
-            </a:r>
-          </a:p>
-          <a:p>
-            <a:pPr marL="240030" indent="-240030" defTabSz="315468">
-              <a:spcBef>
-                <a:spcPts val="2200"/>
-              </a:spcBef>
-              <a:defRPr b="1" sz="1944">
-                <a:latin typeface="Helvetica"/>
-                <a:ea typeface="Helvetica"/>
-                <a:cs typeface="Helvetica"/>
-                <a:sym typeface="Helvetica"/>
-              </a:defRPr>
-            </a:pPr>
-            <a:r>
-              <a:t>Inheritance </a:t>
-            </a:r>
-          </a:p>
-          <a:p>
-            <a:pPr marL="240030" indent="-240030" defTabSz="315468">
-              <a:spcBef>
-                <a:spcPts val="2200"/>
-              </a:spcBef>
-              <a:defRPr b="1" sz="1944">
-                <a:latin typeface="Helvetica"/>
-                <a:ea typeface="Helvetica"/>
-                <a:cs typeface="Helvetica"/>
-                <a:sym typeface="Helvetica"/>
-              </a:defRPr>
-            </a:pPr>
-            <a:r>
-              <a:t>Access modifiers</a:t>
-            </a:r>
-          </a:p>
-          <a:p>
-            <a:pPr marL="240030" indent="-240030" defTabSz="315468">
-              <a:spcBef>
-                <a:spcPts val="2200"/>
-              </a:spcBef>
-              <a:defRPr b="1" sz="1944">
-                <a:latin typeface="Helvetica"/>
-                <a:ea typeface="Helvetica"/>
-                <a:cs typeface="Helvetica"/>
-                <a:sym typeface="Helvetica"/>
-              </a:defRPr>
-            </a:pPr>
-            <a:r>
-              <a:t>Interfaces &amp; Abstract classes</a:t>
-            </a:r>
-          </a:p>
-          <a:p>
-            <a:pPr marL="240030" indent="-240030" defTabSz="315468">
-              <a:spcBef>
-                <a:spcPts val="2200"/>
-              </a:spcBef>
-              <a:defRPr b="1" sz="1944">
-                <a:latin typeface="Helvetica"/>
-                <a:ea typeface="Helvetica"/>
-                <a:cs typeface="Helvetica"/>
-                <a:sym typeface="Helvetica"/>
-              </a:defRPr>
-            </a:pPr>
-            <a:r>
-              <a:t>Polymorphism</a:t>
-            </a:r>
-          </a:p>
-          <a:p>
-            <a:pPr marL="240030" indent="-240030" defTabSz="315468">
-              <a:spcBef>
-                <a:spcPts val="2200"/>
-              </a:spcBef>
-              <a:defRPr b="1" sz="1944">
-                <a:latin typeface="Helvetica"/>
-                <a:ea typeface="Helvetica"/>
-                <a:cs typeface="Helvetica"/>
-                <a:sym typeface="Helvetica"/>
-              </a:defRPr>
-            </a:pPr>
-            <a:r>
-              <a:t>Inner classes, static classes </a:t>
-            </a:r>
-          </a:p>
-          <a:p>
-            <a:pPr marL="240030" indent="-240030" defTabSz="315468">
-              <a:spcBef>
-                <a:spcPts val="2200"/>
-              </a:spcBef>
-              <a:defRPr b="1" sz="1944">
-                <a:latin typeface="Helvetica"/>
-                <a:ea typeface="Helvetica"/>
-                <a:cs typeface="Helvetica"/>
-                <a:sym typeface="Helvetica"/>
-              </a:defRPr>
-            </a:pPr>
-            <a:r>
-              <a:t>Upscaling / Downscaling </a:t>
-            </a:r>
+            <a:pPr/>
           </a:p>
         </p:txBody>
       </p:sp>
@@ -3549,11 +3358,20 @@
         </p:spPr>
         <p:txBody>
           <a:bodyPr/>
-          <a:lstStyle/>
+          <a:lstStyle>
+            <a:lvl1pPr defTabSz="490727">
+              <a:defRPr b="1" sz="6700">
+                <a:latin typeface="+mn-lt"/>
+                <a:ea typeface="+mn-ea"/>
+                <a:cs typeface="+mn-cs"/>
+                <a:sym typeface="Helvetica"/>
+              </a:defRPr>
+            </a:lvl1pPr>
+          </a:lstStyle>
           <a:p>
             <a:pPr/>
             <a:r>
-              <a:t>Exceptions</a:t>
+              <a:t>Object oriented programming</a:t>
             </a:r>
           </a:p>
         </p:txBody>
@@ -3575,9 +3393,179 @@
           <a:bodyPr/>
           <a:lstStyle/>
           <a:p>
-            <a:pPr/>
-            <a:r>
-              <a:t>throwing, catching, writing</a:t>
+            <a:pPr marL="240029" indent="-240029" defTabSz="315468">
+              <a:spcBef>
+                <a:spcPts val="2200"/>
+              </a:spcBef>
+              <a:defRPr b="1" sz="1900">
+                <a:latin typeface="+mn-lt"/>
+                <a:ea typeface="+mn-ea"/>
+                <a:cs typeface="+mn-cs"/>
+                <a:sym typeface="Helvetica"/>
+              </a:defRPr>
+            </a:pPr>
+            <a:r>
+              <a:t>Classes</a:t>
+            </a:r>
+          </a:p>
+          <a:p>
+            <a:pPr marL="240029" indent="-240029" defTabSz="315468">
+              <a:spcBef>
+                <a:spcPts val="2200"/>
+              </a:spcBef>
+              <a:defRPr b="1" sz="1900">
+                <a:latin typeface="+mn-lt"/>
+                <a:ea typeface="+mn-ea"/>
+                <a:cs typeface="+mn-cs"/>
+                <a:sym typeface="Helvetica"/>
+              </a:defRPr>
+            </a:pPr>
+            <a:r>
+              <a:t>Fields</a:t>
+            </a:r>
+          </a:p>
+          <a:p>
+            <a:pPr marL="240029" indent="-240029" defTabSz="315468">
+              <a:spcBef>
+                <a:spcPts val="2200"/>
+              </a:spcBef>
+              <a:defRPr b="1" sz="1900">
+                <a:latin typeface="+mn-lt"/>
+                <a:ea typeface="+mn-ea"/>
+                <a:cs typeface="+mn-cs"/>
+                <a:sym typeface="Helvetica"/>
+              </a:defRPr>
+            </a:pPr>
+            <a:r>
+              <a:t>Methods</a:t>
+            </a:r>
+          </a:p>
+          <a:p>
+            <a:pPr marL="240029" indent="-240029" defTabSz="315468">
+              <a:spcBef>
+                <a:spcPts val="2200"/>
+              </a:spcBef>
+              <a:defRPr b="1" sz="1900">
+                <a:latin typeface="+mn-lt"/>
+                <a:ea typeface="+mn-ea"/>
+                <a:cs typeface="+mn-cs"/>
+                <a:sym typeface="Helvetica"/>
+              </a:defRPr>
+            </a:pPr>
+            <a:r>
+              <a:t>Constructors</a:t>
+            </a:r>
+          </a:p>
+          <a:p>
+            <a:pPr marL="240029" indent="-240029" defTabSz="315468">
+              <a:spcBef>
+                <a:spcPts val="2200"/>
+              </a:spcBef>
+              <a:defRPr b="1" sz="1900">
+                <a:latin typeface="+mn-lt"/>
+                <a:ea typeface="+mn-ea"/>
+                <a:cs typeface="+mn-cs"/>
+                <a:sym typeface="Helvetica"/>
+              </a:defRPr>
+            </a:pPr>
+            <a:r>
+              <a:t>Static members</a:t>
+            </a:r>
+          </a:p>
+          <a:p>
+            <a:pPr marL="240029" indent="-240029" defTabSz="315468">
+              <a:spcBef>
+                <a:spcPts val="2200"/>
+              </a:spcBef>
+              <a:defRPr b="1" sz="1900">
+                <a:latin typeface="+mn-lt"/>
+                <a:ea typeface="+mn-ea"/>
+                <a:cs typeface="+mn-cs"/>
+                <a:sym typeface="Helvetica"/>
+              </a:defRPr>
+            </a:pPr>
+            <a:r>
+              <a:t>Inheritance </a:t>
+            </a:r>
+          </a:p>
+          <a:p>
+            <a:pPr marL="240029" indent="-240029" defTabSz="315468">
+              <a:spcBef>
+                <a:spcPts val="2200"/>
+              </a:spcBef>
+              <a:defRPr b="1" sz="1900">
+                <a:latin typeface="+mn-lt"/>
+                <a:ea typeface="+mn-ea"/>
+                <a:cs typeface="+mn-cs"/>
+                <a:sym typeface="Helvetica"/>
+              </a:defRPr>
+            </a:pPr>
+            <a:r>
+              <a:t>Access modifiers</a:t>
+            </a:r>
+          </a:p>
+          <a:p>
+            <a:pPr marL="240029" indent="-240029" defTabSz="315468">
+              <a:spcBef>
+                <a:spcPts val="2200"/>
+              </a:spcBef>
+              <a:defRPr b="1" sz="1900">
+                <a:latin typeface="+mn-lt"/>
+                <a:ea typeface="+mn-ea"/>
+                <a:cs typeface="+mn-cs"/>
+                <a:sym typeface="Helvetica"/>
+              </a:defRPr>
+            </a:pPr>
+            <a:r>
+              <a:t>Interfaces &amp; Abstract classes</a:t>
+            </a:r>
+          </a:p>
+          <a:p>
+            <a:pPr marL="240029" indent="-240029" defTabSz="315468">
+              <a:spcBef>
+                <a:spcPts val="2200"/>
+              </a:spcBef>
+              <a:defRPr b="1" sz="1900">
+                <a:latin typeface="+mn-lt"/>
+                <a:ea typeface="+mn-ea"/>
+                <a:cs typeface="+mn-cs"/>
+                <a:sym typeface="Helvetica"/>
+              </a:defRPr>
+            </a:pPr>
+            <a:r>
+              <a:t>Polymorphism</a:t>
+            </a:r>
+          </a:p>
+          <a:p>
+            <a:pPr marL="240029" indent="-240029" defTabSz="315468">
+              <a:spcBef>
+                <a:spcPts val="2200"/>
+              </a:spcBef>
+              <a:defRPr b="1" sz="1900">
+                <a:latin typeface="+mn-lt"/>
+                <a:ea typeface="+mn-ea"/>
+                <a:cs typeface="+mn-cs"/>
+                <a:sym typeface="Helvetica"/>
+              </a:defRPr>
+            </a:pPr>
+            <a:r>
+              <a:t>Inner classes, static classes </a:t>
+            </a:r>
+          </a:p>
+          <a:p>
+            <a:pPr marL="240029" indent="-240029" defTabSz="315468">
+              <a:spcBef>
+                <a:spcPts val="2200"/>
+              </a:spcBef>
+              <a:defRPr b="1" sz="1900">
+                <a:latin typeface="+mn-lt"/>
+                <a:ea typeface="+mn-ea"/>
+                <a:cs typeface="+mn-cs"/>
+                <a:sym typeface="Helvetica"/>
+              </a:defRPr>
+            </a:pPr>
+            <a:r>
+              <a:t>Upscaling / Downscaling </a:t>
             </a:r>
           </a:p>
         </p:txBody>
@@ -3627,7 +3615,7 @@
           <a:p>
             <a:pPr/>
             <a:r>
-              <a:t>Generics</a:t>
+              <a:t>Exceptions</a:t>
             </a:r>
           </a:p>
         </p:txBody>
@@ -3650,6 +3638,9 @@
           <a:lstStyle/>
           <a:p>
             <a:pPr/>
+            <a:r>
+              <a:t>throwing, catching, writing</a:t>
+            </a:r>
           </a:p>
         </p:txBody>
       </p:sp>
@@ -3698,7 +3689,7 @@
           <a:p>
             <a:pPr/>
             <a:r>
-              <a:t>Collections</a:t>
+              <a:t>Generics</a:t>
             </a:r>
           </a:p>
         </p:txBody>
@@ -3769,7 +3760,7 @@
           <a:p>
             <a:pPr/>
             <a:r>
-              <a:t>Streams</a:t>
+              <a:t>Collections</a:t>
             </a:r>
           </a:p>
         </p:txBody>
@@ -3783,10 +3774,6 @@
           </p:nvPr>
         </p:nvSpPr>
         <p:spPr>
-          <a:xfrm>
-            <a:off x="520700" y="2609850"/>
-            <a:ext cx="11099800" cy="6286500"/>
-          </a:xfrm>
           <a:prstGeom prst="rect">
             <a:avLst/>
           </a:prstGeom>
@@ -3796,59 +3783,9 @@
           <a:lstStyle/>
           <a:p>
             <a:pPr/>
-            <a:r>
-              <a:t>Binary streams </a:t>
-            </a:r>
-          </a:p>
-          <a:p>
-            <a:pPr/>
-            <a:r>
-              <a:t>Text Streams</a:t>
-            </a:r>
-          </a:p>
-          <a:p>
-            <a:pPr/>
-            <a:r>
-              <a:t>Files</a:t>
-            </a:r>
-          </a:p>
-          <a:p>
-            <a:pPr/>
-            <a:r>
-              <a:t>Serialisation</a:t>
-            </a:r>
           </a:p>
         </p:txBody>
       </p:sp>
-      <p:pic>
-        <p:nvPicPr>
-          <p:cNvPr id="181" name="image5.png"/>
-          <p:cNvPicPr>
-            <a:picLocks noChangeAspect="1"/>
-          </p:cNvPicPr>
-          <p:nvPr/>
-        </p:nvPicPr>
-        <p:blipFill>
-          <a:blip r:embed="rId2">
-            <a:extLst/>
-          </a:blip>
-          <a:stretch>
-            <a:fillRect/>
-          </a:stretch>
-        </p:blipFill>
-        <p:spPr>
-          <a:xfrm>
-            <a:off x="4254500" y="3522123"/>
-            <a:ext cx="8785891" cy="4941287"/>
-          </a:xfrm>
-          <a:prstGeom prst="rect">
-            <a:avLst/>
-          </a:prstGeom>
-          <a:ln w="12700">
-            <a:miter lim="400000"/>
-          </a:ln>
-        </p:spPr>
-      </p:pic>
     </p:spTree>
   </p:cSld>
   <p:clrMapOvr>
@@ -3877,7 +3814,7 @@
       </p:grpSpPr>
       <p:sp>
         <p:nvSpPr>
-          <p:cNvPr id="183" name="Shape 183"/>
+          <p:cNvPr id="182" name="Shape 182"/>
           <p:cNvSpPr/>
           <p:nvPr>
             <p:ph type="title"/>
@@ -3894,20 +3831,24 @@
           <a:p>
             <a:pPr/>
             <a:r>
-              <a:t>Swing</a:t>
+              <a:t>Streams</a:t>
             </a:r>
           </a:p>
         </p:txBody>
       </p:sp>
       <p:sp>
         <p:nvSpPr>
-          <p:cNvPr id="184" name="Shape 184"/>
+          <p:cNvPr id="183" name="Shape 183"/>
           <p:cNvSpPr/>
           <p:nvPr>
             <p:ph type="body" idx="1"/>
           </p:nvPr>
         </p:nvSpPr>
         <p:spPr>
+          <a:xfrm>
+            <a:off x="520700" y="2609850"/>
+            <a:ext cx="11099800" cy="6286500"/>
+          </a:xfrm>
           <a:prstGeom prst="rect">
             <a:avLst/>
           </a:prstGeom>
@@ -3917,9 +3858,59 @@
           <a:lstStyle/>
           <a:p>
             <a:pPr/>
+            <a:r>
+              <a:t>Binary streams </a:t>
+            </a:r>
+          </a:p>
+          <a:p>
+            <a:pPr/>
+            <a:r>
+              <a:t>Text Streams</a:t>
+            </a:r>
+          </a:p>
+          <a:p>
+            <a:pPr/>
+            <a:r>
+              <a:t>Files</a:t>
+            </a:r>
+          </a:p>
+          <a:p>
+            <a:pPr/>
+            <a:r>
+              <a:t>Serialisation</a:t>
+            </a:r>
           </a:p>
         </p:txBody>
       </p:sp>
+      <p:pic>
+        <p:nvPicPr>
+          <p:cNvPr id="184" name="image2.png"/>
+          <p:cNvPicPr>
+            <a:picLocks noChangeAspect="1"/>
+          </p:cNvPicPr>
+          <p:nvPr/>
+        </p:nvPicPr>
+        <p:blipFill>
+          <a:blip r:embed="rId2">
+            <a:extLst/>
+          </a:blip>
+          <a:stretch>
+            <a:fillRect/>
+          </a:stretch>
+        </p:blipFill>
+        <p:spPr>
+          <a:xfrm>
+            <a:off x="4254500" y="3522121"/>
+            <a:ext cx="8785891" cy="4941290"/>
+          </a:xfrm>
+          <a:prstGeom prst="rect">
+            <a:avLst/>
+          </a:prstGeom>
+          <a:ln w="12700">
+            <a:miter lim="400000"/>
+          </a:ln>
+        </p:spPr>
+      </p:pic>
     </p:spTree>
   </p:cSld>
   <p:clrMapOvr>
@@ -3965,7 +3956,7 @@
           <a:p>
             <a:pPr/>
             <a:r>
-              <a:t>Lambdas</a:t>
+              <a:t>Swing</a:t>
             </a:r>
           </a:p>
         </p:txBody>
@@ -4036,7 +4027,7 @@
           <a:p>
             <a:pPr/>
             <a:r>
-              <a:t>Variables</a:t>
+              <a:t>What we will NOT cover</a:t>
             </a:r>
           </a:p>
         </p:txBody>
@@ -4045,12 +4036,231 @@
         <p:nvSpPr>
           <p:cNvPr id="123" name="Shape 123"/>
           <p:cNvSpPr/>
+          <p:nvPr>
+            <p:ph type="body" idx="1"/>
+          </p:nvPr>
+        </p:nvSpPr>
+        <p:spPr>
+          <a:prstGeom prst="rect">
+            <a:avLst/>
+          </a:prstGeom>
+        </p:spPr>
+        <p:txBody>
+          <a:bodyPr/>
+          <a:lstStyle/>
+          <a:p>
+            <a:pPr/>
+            <a:r>
+              <a:t>How to install Java (Java 8 is required)</a:t>
+            </a:r>
+          </a:p>
+          <a:p>
+            <a:pPr lvl="2"/>
+            <a:r>
+              <a:t>What is the difference between JRE and JDK?</a:t>
+            </a:r>
+          </a:p>
+          <a:p>
+            <a:pPr lvl="2"/>
+            <a:r>
+              <a:t>What is x64 and x86 or linux/mac/windows</a:t>
+            </a:r>
+          </a:p>
+          <a:p>
+            <a:pPr/>
+            <a:r>
+              <a:t>How to install Eclipse, IDEA, Netbeans or J****, it is up to you to decide what you want to use. </a:t>
+            </a:r>
+          </a:p>
+          <a:p>
+            <a:pPr/>
+            <a:r>
+              <a:t>How to install any additional editors, tools or software</a:t>
+            </a:r>
+          </a:p>
+        </p:txBody>
+      </p:sp>
+    </p:spTree>
+  </p:cSld>
+  <p:clrMapOvr>
+    <a:masterClrMapping/>
+  </p:clrMapOvr>
+  <p:transition xmlns:p14="http://schemas.microsoft.com/office/powerpoint/2010/main" spd="med" advClick="1" p14:dur="1000"/>
+</p:sld>
+</file>
+
+<file path=ppt/slides/slide20.xml><?xml version="1.0" encoding="utf-8"?>
+<p:sld xmlns:a="http://schemas.openxmlformats.org/drawingml/2006/main" xmlns:r="http://schemas.openxmlformats.org/officeDocument/2006/relationships" xmlns:p="http://schemas.openxmlformats.org/presentationml/2006/main" showMasterSp="1" showMasterPhAnim="1">
+  <p:cSld>
+    <p:spTree>
+      <p:nvGrpSpPr>
+        <p:cNvPr id="1" name=""/>
+        <p:cNvGrpSpPr/>
+        <p:nvPr/>
+      </p:nvGrpSpPr>
+      <p:grpSpPr>
+        <a:xfrm>
+          <a:off x="0" y="0"/>
+          <a:ext cx="0" cy="0"/>
+          <a:chOff x="0" y="0"/>
+          <a:chExt cx="0" cy="0"/>
+        </a:xfrm>
+      </p:grpSpPr>
+      <p:sp>
+        <p:nvSpPr>
+          <p:cNvPr id="189" name="Shape 189"/>
+          <p:cNvSpPr/>
+          <p:nvPr>
+            <p:ph type="title"/>
+          </p:nvPr>
+        </p:nvSpPr>
+        <p:spPr>
+          <a:prstGeom prst="rect">
+            <a:avLst/>
+          </a:prstGeom>
+        </p:spPr>
+        <p:txBody>
+          <a:bodyPr/>
+          <a:lstStyle/>
+          <a:p>
+            <a:pPr/>
+            <a:r>
+              <a:t>Lambdas</a:t>
+            </a:r>
+          </a:p>
+        </p:txBody>
+      </p:sp>
+      <p:sp>
+        <p:nvSpPr>
+          <p:cNvPr id="190" name="Shape 190"/>
+          <p:cNvSpPr/>
+          <p:nvPr>
+            <p:ph type="body" idx="1"/>
+          </p:nvPr>
+        </p:nvSpPr>
+        <p:spPr>
+          <a:prstGeom prst="rect">
+            <a:avLst/>
+          </a:prstGeom>
+        </p:spPr>
+        <p:txBody>
+          <a:bodyPr/>
+          <a:lstStyle/>
+          <a:p>
+            <a:pPr/>
+          </a:p>
+        </p:txBody>
+      </p:sp>
+    </p:spTree>
+  </p:cSld>
+  <p:clrMapOvr>
+    <a:masterClrMapping/>
+  </p:clrMapOvr>
+  <p:transition xmlns:p14="http://schemas.microsoft.com/office/powerpoint/2010/main" spd="med" advClick="1" p14:dur="1000"/>
+</p:sld>
+</file>
+
+<file path=ppt/slides/slide21.xml><?xml version="1.0" encoding="utf-8"?>
+<p:sld xmlns:a="http://schemas.openxmlformats.org/drawingml/2006/main" xmlns:r="http://schemas.openxmlformats.org/officeDocument/2006/relationships" xmlns:p="http://schemas.openxmlformats.org/presentationml/2006/main" showMasterSp="1" showMasterPhAnim="1">
+  <p:cSld>
+    <p:spTree>
+      <p:nvGrpSpPr>
+        <p:cNvPr id="1" name=""/>
+        <p:cNvGrpSpPr/>
+        <p:nvPr/>
+      </p:nvGrpSpPr>
+      <p:grpSpPr>
+        <a:xfrm>
+          <a:off x="0" y="0"/>
+          <a:ext cx="0" cy="0"/>
+          <a:chOff x="0" y="0"/>
+          <a:chExt cx="0" cy="0"/>
+        </a:xfrm>
+      </p:grpSpPr>
+      <p:sp>
+        <p:nvSpPr>
+          <p:cNvPr id="192" name="Shape 192"/>
+          <p:cNvSpPr/>
+          <p:nvPr>
+            <p:ph type="title"/>
+          </p:nvPr>
+        </p:nvSpPr>
+        <p:spPr>
+          <a:prstGeom prst="rect">
+            <a:avLst/>
+          </a:prstGeom>
+        </p:spPr>
+        <p:txBody>
+          <a:bodyPr/>
+          <a:lstStyle/>
+          <a:p>
+            <a:pPr/>
+            <a:r>
+              <a:t>Now … the advanced Java course.</a:t>
+            </a:r>
+          </a:p>
+        </p:txBody>
+      </p:sp>
+    </p:spTree>
+  </p:cSld>
+  <p:clrMapOvr>
+    <a:masterClrMapping/>
+  </p:clrMapOvr>
+  <p:transition xmlns:p14="http://schemas.microsoft.com/office/powerpoint/2010/main" spd="med" advClick="1" p14:dur="1000"/>
+</p:sld>
+</file>
+
+<file path=ppt/slides/slide3.xml><?xml version="1.0" encoding="utf-8"?>
+<p:sld xmlns:a="http://schemas.openxmlformats.org/drawingml/2006/main" xmlns:r="http://schemas.openxmlformats.org/officeDocument/2006/relationships" xmlns:p="http://schemas.openxmlformats.org/presentationml/2006/main" showMasterSp="1" showMasterPhAnim="1">
+  <p:cSld>
+    <p:spTree>
+      <p:nvGrpSpPr>
+        <p:cNvPr id="1" name=""/>
+        <p:cNvGrpSpPr/>
+        <p:nvPr/>
+      </p:nvGrpSpPr>
+      <p:grpSpPr>
+        <a:xfrm>
+          <a:off x="0" y="0"/>
+          <a:ext cx="0" cy="0"/>
+          <a:chOff x="0" y="0"/>
+          <a:chExt cx="0" cy="0"/>
+        </a:xfrm>
+      </p:grpSpPr>
+      <p:sp>
+        <p:nvSpPr>
+          <p:cNvPr id="125" name="Shape 125"/>
+          <p:cNvSpPr/>
+          <p:nvPr>
+            <p:ph type="title"/>
+          </p:nvPr>
+        </p:nvSpPr>
+        <p:spPr>
+          <a:prstGeom prst="rect">
+            <a:avLst/>
+          </a:prstGeom>
+        </p:spPr>
+        <p:txBody>
+          <a:bodyPr/>
+          <a:lstStyle/>
+          <a:p>
+            <a:pPr/>
+            <a:r>
+              <a:t>Variables</a:t>
+            </a:r>
+          </a:p>
+        </p:txBody>
+      </p:sp>
+      <p:sp>
+        <p:nvSpPr>
+          <p:cNvPr id="126" name="Shape 126"/>
+          <p:cNvSpPr/>
           <p:nvPr/>
         </p:nvSpPr>
         <p:spPr>
           <a:xfrm>
             <a:off x="4902200" y="4901227"/>
-            <a:ext cx="3276600" cy="1017946"/>
+            <a:ext cx="3276600" cy="548041"/>
           </a:xfrm>
           <a:prstGeom prst="rect">
             <a:avLst/>
@@ -4065,7 +4275,7 @@
           </a:extLst>
         </p:spPr>
         <p:txBody>
-          <a:bodyPr lIns="45719" rIns="45719">
+          <a:bodyPr lIns="45718" tIns="45718" rIns="45718" bIns="45718">
             <a:spAutoFit/>
           </a:bodyPr>
           <a:lstStyle/>
@@ -4129,28 +4339,28 @@
       </p:sp>
       <p:grpSp>
         <p:nvGrpSpPr>
-          <p:cNvPr id="126" name="Group 126"/>
+          <p:cNvPr id="129" name="Group 129"/>
           <p:cNvGrpSpPr/>
           <p:nvPr/>
         </p:nvGrpSpPr>
         <p:grpSpPr>
           <a:xfrm>
             <a:off x="7569200" y="3834427"/>
-            <a:ext cx="1371600" cy="457201"/>
+            <a:ext cx="1371600" cy="457204"/>
             <a:chOff x="0" y="0"/>
-            <a:chExt cx="1371600" cy="457200"/>
+            <a:chExt cx="1371600" cy="457202"/>
           </a:xfrm>
         </p:grpSpPr>
         <p:sp>
           <p:nvSpPr>
-            <p:cNvPr id="124" name="Shape 124"/>
+            <p:cNvPr id="127" name="Shape 127"/>
             <p:cNvSpPr/>
             <p:nvPr/>
           </p:nvSpPr>
           <p:spPr>
             <a:xfrm>
               <a:off x="0" y="0"/>
-              <a:ext cx="1371600" cy="457200"/>
+              <a:ext cx="1371600" cy="457203"/>
             </a:xfrm>
             <a:prstGeom prst="wedgeEllipseCallout">
               <a:avLst>
@@ -4185,7 +4395,7 @@
             </a:effectLst>
           </p:spPr>
           <p:txBody>
-            <a:bodyPr wrap="square" lIns="45719" tIns="45719" rIns="45719" bIns="45719" numCol="1" anchor="ctr">
+            <a:bodyPr wrap="square" lIns="50800" tIns="50800" rIns="50800" bIns="50800" numCol="1" anchor="ctr">
               <a:noAutofit/>
             </a:bodyPr>
             <a:lstStyle/>
@@ -4206,14 +4416,14 @@
         </p:sp>
         <p:sp>
           <p:nvSpPr>
-            <p:cNvPr id="125" name="Shape 125"/>
+            <p:cNvPr id="128" name="Shape 128"/>
             <p:cNvSpPr/>
             <p:nvPr/>
           </p:nvSpPr>
           <p:spPr>
             <a:xfrm>
               <a:off x="200865" y="55879"/>
-              <a:ext cx="969870" cy="345441"/>
+              <a:ext cx="969870" cy="345437"/>
             </a:xfrm>
             <a:prstGeom prst="rect">
               <a:avLst/>
@@ -4231,7 +4441,7 @@
             </a:extLst>
           </p:spPr>
           <p:txBody>
-            <a:bodyPr wrap="square" lIns="45719" tIns="45719" rIns="45719" bIns="45719" numCol="1" anchor="ctr">
+            <a:bodyPr wrap="square" lIns="45718" tIns="45718" rIns="45718" bIns="45718" numCol="1" anchor="ctr">
               <a:spAutoFit/>
             </a:bodyPr>
             <a:lstStyle>
@@ -4258,28 +4468,28 @@
       </p:grpSp>
       <p:grpSp>
         <p:nvGrpSpPr>
-          <p:cNvPr id="129" name="Group 129"/>
+          <p:cNvPr id="132" name="Group 132"/>
           <p:cNvGrpSpPr/>
           <p:nvPr/>
         </p:nvGrpSpPr>
         <p:grpSpPr>
           <a:xfrm>
             <a:off x="5283200" y="3834427"/>
-            <a:ext cx="1447800" cy="457201"/>
+            <a:ext cx="1447800" cy="457204"/>
             <a:chOff x="0" y="0"/>
-            <a:chExt cx="1447800" cy="457200"/>
+            <a:chExt cx="1447800" cy="457202"/>
           </a:xfrm>
         </p:grpSpPr>
         <p:sp>
           <p:nvSpPr>
-            <p:cNvPr id="127" name="Shape 127"/>
+            <p:cNvPr id="130" name="Shape 130"/>
             <p:cNvSpPr/>
             <p:nvPr/>
           </p:nvSpPr>
           <p:spPr>
             <a:xfrm>
               <a:off x="0" y="0"/>
-              <a:ext cx="1447800" cy="457200"/>
+              <a:ext cx="1447800" cy="457203"/>
             </a:xfrm>
             <a:prstGeom prst="wedgeEllipseCallout">
               <a:avLst>
@@ -4314,7 +4524,7 @@
             </a:effectLst>
           </p:spPr>
           <p:txBody>
-            <a:bodyPr wrap="square" lIns="45719" tIns="45719" rIns="45719" bIns="45719" numCol="1" anchor="ctr">
+            <a:bodyPr wrap="square" lIns="50800" tIns="50800" rIns="50800" bIns="50800" numCol="1" anchor="ctr">
               <a:noAutofit/>
             </a:bodyPr>
             <a:lstStyle/>
@@ -4335,14 +4545,14 @@
         </p:sp>
         <p:sp>
           <p:nvSpPr>
-            <p:cNvPr id="128" name="Shape 128"/>
+            <p:cNvPr id="131" name="Shape 131"/>
             <p:cNvSpPr/>
             <p:nvPr/>
           </p:nvSpPr>
           <p:spPr>
             <a:xfrm>
-              <a:off x="212024" y="55879"/>
-              <a:ext cx="1023752" cy="345441"/>
+              <a:off x="212022" y="55879"/>
+              <a:ext cx="1023754" cy="345437"/>
             </a:xfrm>
             <a:prstGeom prst="rect">
               <a:avLst/>
@@ -4360,7 +4570,7 @@
             </a:extLst>
           </p:spPr>
           <p:txBody>
-            <a:bodyPr wrap="square" lIns="45719" tIns="45719" rIns="45719" bIns="45719" numCol="1" anchor="ctr">
+            <a:bodyPr wrap="square" lIns="45718" tIns="45718" rIns="45718" bIns="45718" numCol="1" anchor="ctr">
               <a:spAutoFit/>
             </a:bodyPr>
             <a:lstStyle>
@@ -4387,28 +4597,28 @@
       </p:grpSp>
       <p:grpSp>
         <p:nvGrpSpPr>
-          <p:cNvPr id="132" name="Group 132"/>
+          <p:cNvPr id="135" name="Group 135"/>
           <p:cNvGrpSpPr/>
           <p:nvPr/>
         </p:nvGrpSpPr>
         <p:grpSpPr>
           <a:xfrm>
             <a:off x="2997200" y="4063027"/>
-            <a:ext cx="1447800" cy="457201"/>
+            <a:ext cx="1447800" cy="457204"/>
             <a:chOff x="0" y="0"/>
-            <a:chExt cx="1447800" cy="457200"/>
+            <a:chExt cx="1447800" cy="457202"/>
           </a:xfrm>
         </p:grpSpPr>
         <p:sp>
           <p:nvSpPr>
-            <p:cNvPr id="130" name="Shape 130"/>
+            <p:cNvPr id="133" name="Shape 133"/>
             <p:cNvSpPr/>
             <p:nvPr/>
           </p:nvSpPr>
           <p:spPr>
             <a:xfrm>
               <a:off x="0" y="0"/>
-              <a:ext cx="1447800" cy="457200"/>
+              <a:ext cx="1447800" cy="457203"/>
             </a:xfrm>
             <a:prstGeom prst="wedgeEllipseCallout">
               <a:avLst>
@@ -4443,7 +4653,7 @@
             </a:effectLst>
           </p:spPr>
           <p:txBody>
-            <a:bodyPr wrap="square" lIns="45719" tIns="45719" rIns="45719" bIns="45719" numCol="1" anchor="ctr">
+            <a:bodyPr wrap="square" lIns="50800" tIns="50800" rIns="50800" bIns="50800" numCol="1" anchor="ctr">
               <a:noAutofit/>
             </a:bodyPr>
             <a:lstStyle/>
@@ -4464,14 +4674,14 @@
         </p:sp>
         <p:sp>
           <p:nvSpPr>
-            <p:cNvPr id="131" name="Shape 131"/>
+            <p:cNvPr id="134" name="Shape 134"/>
             <p:cNvSpPr/>
             <p:nvPr/>
           </p:nvSpPr>
           <p:spPr>
             <a:xfrm>
-              <a:off x="212024" y="55879"/>
-              <a:ext cx="1023752" cy="345441"/>
+              <a:off x="212022" y="55879"/>
+              <a:ext cx="1023754" cy="345437"/>
             </a:xfrm>
             <a:prstGeom prst="rect">
               <a:avLst/>
@@ -4489,7 +4699,7 @@
             </a:extLst>
           </p:spPr>
           <p:txBody>
-            <a:bodyPr wrap="square" lIns="45719" tIns="45719" rIns="45719" bIns="45719" numCol="1" anchor="ctr">
+            <a:bodyPr wrap="square" lIns="45718" tIns="45718" rIns="45718" bIns="45718" numCol="1" anchor="ctr">
               <a:spAutoFit/>
             </a:bodyPr>
             <a:lstStyle>
@@ -4523,222 +4733,6 @@
 </p:sld>
 </file>
 
-<file path=ppt/slides/slide3.xml><?xml version="1.0" encoding="utf-8"?>
-<p:sld xmlns:a="http://schemas.openxmlformats.org/drawingml/2006/main" xmlns:r="http://schemas.openxmlformats.org/officeDocument/2006/relationships" xmlns:p="http://schemas.openxmlformats.org/presentationml/2006/main" showMasterSp="1" showMasterPhAnim="1">
-  <p:cSld>
-    <p:spTree>
-      <p:nvGrpSpPr>
-        <p:cNvPr id="1" name=""/>
-        <p:cNvGrpSpPr/>
-        <p:nvPr/>
-      </p:nvGrpSpPr>
-      <p:grpSpPr>
-        <a:xfrm>
-          <a:off x="0" y="0"/>
-          <a:ext cx="0" cy="0"/>
-          <a:chOff x="0" y="0"/>
-          <a:chExt cx="0" cy="0"/>
-        </a:xfrm>
-      </p:grpSpPr>
-      <p:sp>
-        <p:nvSpPr>
-          <p:cNvPr id="134" name="Shape 134"/>
-          <p:cNvSpPr/>
-          <p:nvPr>
-            <p:ph type="title"/>
-          </p:nvPr>
-        </p:nvSpPr>
-        <p:spPr>
-          <a:prstGeom prst="rect">
-            <a:avLst/>
-          </a:prstGeom>
-        </p:spPr>
-        <p:txBody>
-          <a:bodyPr/>
-          <a:lstStyle/>
-          <a:p>
-            <a:pPr/>
-            <a:r>
-              <a:t>Primitive Types</a:t>
-            </a:r>
-          </a:p>
-        </p:txBody>
-      </p:sp>
-      <p:sp>
-        <p:nvSpPr>
-          <p:cNvPr id="135" name="Shape 135"/>
-          <p:cNvSpPr/>
-          <p:nvPr/>
-        </p:nvSpPr>
-        <p:spPr>
-          <a:xfrm>
-            <a:off x="127710" y="2402190"/>
-            <a:ext cx="5101326" cy="3095020"/>
-          </a:xfrm>
-          <a:prstGeom prst="rect">
-            <a:avLst/>
-          </a:prstGeom>
-          <a:ln w="12700">
-            <a:miter lim="400000"/>
-          </a:ln>
-          <a:extLst>
-            <a:ext uri="{C572A759-6A51-4108-AA02-DFA0A04FC94B}">
-              <ma14:wrappingTextBoxFlag xmlns:ma14="http://schemas.microsoft.com/office/mac/drawingml/2011/main" val="1"/>
-            </a:ext>
-          </a:extLst>
-        </p:spPr>
-        <p:txBody>
-          <a:bodyPr wrap="none" lIns="50800" tIns="50800" rIns="50800" bIns="50800" anchor="ctr">
-            <a:spAutoFit/>
-          </a:bodyPr>
-          <a:lstStyle/>
-          <a:p>
-            <a:pPr marL="438912" indent="-320040" algn="l" defTabSz="914400">
-              <a:buClr>
-                <a:srgbClr val="F0AD00"/>
-              </a:buClr>
-              <a:buSzPct val="80000"/>
-              <a:buFont typeface="Wingdings 2"/>
-              <a:buChar char="◼"/>
-              <a:defRPr>
-                <a:latin typeface="Arial"/>
-                <a:ea typeface="Arial"/>
-                <a:cs typeface="Arial"/>
-                <a:sym typeface="Arial"/>
-              </a:defRPr>
-            </a:pPr>
-            <a:r>
-              <a:t>Primitive types in java</a:t>
-            </a:r>
-          </a:p>
-          <a:p>
-            <a:pPr lvl="1" marL="731519" indent="-274319" algn="l" defTabSz="914400">
-              <a:spcBef>
-                <a:spcPts val="600"/>
-              </a:spcBef>
-              <a:buClr>
-                <a:srgbClr val="60B5CC"/>
-              </a:buClr>
-              <a:buSzPct val="90000"/>
-              <a:buFont typeface="Wingdings"/>
-              <a:buChar char="▪"/>
-              <a:defRPr>
-                <a:latin typeface="Arial"/>
-                <a:ea typeface="Arial"/>
-                <a:cs typeface="Arial"/>
-                <a:sym typeface="Arial"/>
-              </a:defRPr>
-            </a:pPr>
-            <a:r>
-              <a:t>byte, short, int, long</a:t>
-            </a:r>
-          </a:p>
-          <a:p>
-            <a:pPr lvl="1" marL="731519" indent="-274319" algn="l" defTabSz="914400">
-              <a:spcBef>
-                <a:spcPts val="600"/>
-              </a:spcBef>
-              <a:buClr>
-                <a:srgbClr val="60B5CC"/>
-              </a:buClr>
-              <a:buSzPct val="90000"/>
-              <a:buFont typeface="Wingdings"/>
-              <a:buChar char="▪"/>
-              <a:defRPr>
-                <a:latin typeface="Arial"/>
-                <a:ea typeface="Arial"/>
-                <a:cs typeface="Arial"/>
-                <a:sym typeface="Arial"/>
-              </a:defRPr>
-            </a:pPr>
-            <a:r>
-              <a:t>float, double</a:t>
-            </a:r>
-          </a:p>
-          <a:p>
-            <a:pPr lvl="1" marL="731519" indent="-274319" algn="l" defTabSz="914400">
-              <a:spcBef>
-                <a:spcPts val="600"/>
-              </a:spcBef>
-              <a:buClr>
-                <a:srgbClr val="60B5CC"/>
-              </a:buClr>
-              <a:buSzPct val="90000"/>
-              <a:buFont typeface="Wingdings"/>
-              <a:buChar char="▪"/>
-              <a:defRPr>
-                <a:latin typeface="Arial"/>
-                <a:ea typeface="Arial"/>
-                <a:cs typeface="Arial"/>
-                <a:sym typeface="Arial"/>
-              </a:defRPr>
-            </a:pPr>
-            <a:r>
-              <a:t>boolean</a:t>
-            </a:r>
-          </a:p>
-          <a:p>
-            <a:pPr lvl="1" marL="731519" indent="-274319" algn="l" defTabSz="914400">
-              <a:spcBef>
-                <a:spcPts val="600"/>
-              </a:spcBef>
-              <a:buClr>
-                <a:srgbClr val="60B5CC"/>
-              </a:buClr>
-              <a:buSzPct val="90000"/>
-              <a:buFont typeface="Wingdings"/>
-              <a:buChar char="▪"/>
-              <a:defRPr>
-                <a:latin typeface="Arial"/>
-                <a:ea typeface="Arial"/>
-                <a:cs typeface="Arial"/>
-                <a:sym typeface="Arial"/>
-              </a:defRPr>
-            </a:pPr>
-            <a:r>
-              <a:t>char</a:t>
-            </a:r>
-          </a:p>
-        </p:txBody>
-      </p:sp>
-      <p:pic>
-        <p:nvPicPr>
-          <p:cNvPr id="136" name="image4.gif" descr="http://www.ntu.edu.sg/home/ehchua/programming/java/images/Type_Primitive.gif"/>
-          <p:cNvPicPr>
-            <a:picLocks noChangeAspect="1"/>
-          </p:cNvPicPr>
-          <p:nvPr/>
-        </p:nvPicPr>
-        <p:blipFill>
-          <a:blip r:embed="rId2">
-            <a:extLst/>
-          </a:blip>
-          <a:stretch>
-            <a:fillRect/>
-          </a:stretch>
-        </p:blipFill>
-        <p:spPr>
-          <a:xfrm>
-            <a:off x="3218862" y="4178301"/>
-            <a:ext cx="6952780" cy="3682998"/>
-          </a:xfrm>
-          <a:prstGeom prst="rect">
-            <a:avLst/>
-          </a:prstGeom>
-          <a:ln w="12700">
-            <a:miter lim="400000"/>
-          </a:ln>
-        </p:spPr>
-      </p:pic>
-    </p:spTree>
-  </p:cSld>
-  <p:clrMapOvr>
-    <a:masterClrMapping/>
-  </p:clrMapOvr>
-  <p:transition xmlns:p14="http://schemas.microsoft.com/office/powerpoint/2010/main" spd="med" advClick="1" p14:dur="1000"/>
-</p:sld>
-</file>
-
 <file path=ppt/slides/slide4.xml><?xml version="1.0" encoding="utf-8"?>
 <p:sld xmlns:a="http://schemas.openxmlformats.org/drawingml/2006/main" xmlns:r="http://schemas.openxmlformats.org/officeDocument/2006/relationships" xmlns:p="http://schemas.openxmlformats.org/presentationml/2006/main" showMasterSp="1" showMasterPhAnim="1">
   <p:cSld>
@@ -4758,7 +4752,7 @@
       </p:grpSpPr>
       <p:sp>
         <p:nvSpPr>
-          <p:cNvPr id="138" name="Shape 138"/>
+          <p:cNvPr id="137" name="Shape 137"/>
           <p:cNvSpPr/>
           <p:nvPr>
             <p:ph type="title"/>
@@ -4775,21 +4769,21 @@
           <a:p>
             <a:pPr/>
             <a:r>
-              <a:t>Primitive Types size</a:t>
+              <a:t>Primitive Types</a:t>
             </a:r>
           </a:p>
         </p:txBody>
       </p:sp>
       <p:sp>
         <p:nvSpPr>
-          <p:cNvPr id="139" name="Shape 139"/>
+          <p:cNvPr id="138" name="Shape 138"/>
           <p:cNvSpPr/>
           <p:nvPr/>
         </p:nvSpPr>
         <p:spPr>
           <a:xfrm>
-            <a:off x="939800" y="2324100"/>
-            <a:ext cx="9144000" cy="5334000"/>
+            <a:off x="127710" y="2420477"/>
+            <a:ext cx="5101326" cy="3058444"/>
           </a:xfrm>
           <a:prstGeom prst="rect">
             <a:avLst/>
@@ -4804,8 +4798,8 @@
           </a:extLst>
         </p:spPr>
         <p:txBody>
-          <a:bodyPr lIns="45719" rIns="45719">
-            <a:normAutofit fontScale="100000" lnSpcReduction="0"/>
+          <a:bodyPr wrap="none" lIns="50800" tIns="50800" rIns="50800" bIns="50800" anchor="ctr">
+            <a:spAutoFit/>
           </a:bodyPr>
           <a:lstStyle/>
           <a:p>
@@ -4816,350 +4810,127 @@
               <a:buSzPct val="80000"/>
               <a:buFont typeface="Wingdings 2"/>
               <a:buChar char="◼"/>
-              <a:defRPr sz="3200">
-                <a:latin typeface="Corbel"/>
-                <a:ea typeface="Corbel"/>
-                <a:cs typeface="Corbel"/>
-                <a:sym typeface="Corbel"/>
+              <a:defRPr>
+                <a:latin typeface="Arial"/>
+                <a:ea typeface="Arial"/>
+                <a:cs typeface="Arial"/>
+                <a:sym typeface="Arial"/>
               </a:defRPr>
             </a:pPr>
             <a:r>
-              <a:t>Numeric types are </a:t>
-            </a:r>
-            <a:r>
-              <a:t>byte, short, long, int, double, float</a:t>
-            </a:r>
-          </a:p>
-          <a:p>
-            <a:pPr marL="438912" indent="-320040" algn="l" defTabSz="914400">
+              <a:t>Primitive types in java</a:t>
+            </a:r>
+          </a:p>
+          <a:p>
+            <a:pPr lvl="1" marL="731519" indent="-274319" algn="l" defTabSz="914400">
+              <a:spcBef>
+                <a:spcPts val="600"/>
+              </a:spcBef>
               <a:buClr>
-                <a:srgbClr val="F0AD00"/>
+                <a:srgbClr val="60B5CC"/>
               </a:buClr>
-              <a:buSzPct val="80000"/>
-              <a:buFont typeface="Wingdings 2"/>
-              <a:buChar char="◼"/>
-              <a:defRPr sz="3200">
-                <a:latin typeface="Corbel"/>
-                <a:ea typeface="Corbel"/>
-                <a:cs typeface="Corbel"/>
-                <a:sym typeface="Corbel"/>
+              <a:buSzPct val="90000"/>
+              <a:buFont typeface="Wingdings"/>
+              <a:buChar char="▪"/>
+              <a:defRPr>
+                <a:latin typeface="Arial"/>
+                <a:ea typeface="Arial"/>
+                <a:cs typeface="Arial"/>
+                <a:sym typeface="Arial"/>
               </a:defRPr>
             </a:pPr>
             <a:r>
-              <a:t>byte – 8b (-128 : 127)</a:t>
-            </a:r>
-          </a:p>
-          <a:p>
-            <a:pPr marL="320040" indent="-201168" algn="l" defTabSz="914400">
+              <a:t>byte, short, int, long</a:t>
+            </a:r>
+          </a:p>
+          <a:p>
+            <a:pPr lvl="1" marL="731519" indent="-274319" algn="l" defTabSz="914400">
+              <a:spcBef>
+                <a:spcPts val="600"/>
+              </a:spcBef>
               <a:buClr>
-                <a:srgbClr val="F0AD00"/>
+                <a:srgbClr val="60B5CC"/>
               </a:buClr>
-              <a:buFont typeface="Wingdings 2"/>
-              <a:defRPr sz="3200">
-                <a:solidFill>
-                  <a:srgbClr val="8000FF"/>
-                </a:solidFill>
-                <a:latin typeface="Courier New"/>
-                <a:ea typeface="Courier New"/>
-                <a:cs typeface="Courier New"/>
-                <a:sym typeface="Courier New"/>
+              <a:buSzPct val="90000"/>
+              <a:buFont typeface="Wingdings"/>
+              <a:buChar char="▪"/>
+              <a:defRPr>
+                <a:latin typeface="Arial"/>
+                <a:ea typeface="Arial"/>
+                <a:cs typeface="Arial"/>
+                <a:sym typeface="Arial"/>
               </a:defRPr>
             </a:pPr>
             <a:r>
-              <a:t>		</a:t>
-            </a:r>
-            <a:r>
-              <a:rPr i="1"/>
-              <a:t>byte</a:t>
-            </a:r>
-            <a:r>
-              <a:rPr i="1">
-                <a:solidFill>
-                  <a:srgbClr val="000000"/>
-                </a:solidFill>
-              </a:rPr>
-              <a:t> b </a:t>
-            </a:r>
-            <a:r>
-              <a:rPr b="1" i="1">
-                <a:solidFill>
-                  <a:srgbClr val="000080"/>
-                </a:solidFill>
-              </a:rPr>
-              <a:t>=</a:t>
-            </a:r>
-            <a:r>
-              <a:rPr i="1">
-                <a:solidFill>
-                  <a:srgbClr val="000000"/>
-                </a:solidFill>
-              </a:rPr>
-              <a:t> </a:t>
-            </a:r>
-            <a:r>
-              <a:rPr i="1">
-                <a:solidFill>
-                  <a:srgbClr val="FF8000"/>
-                </a:solidFill>
-              </a:rPr>
-              <a:t>100</a:t>
-            </a:r>
-            <a:r>
-              <a:rPr b="1" i="1">
-                <a:solidFill>
-                  <a:srgbClr val="000080"/>
-                </a:solidFill>
-              </a:rPr>
-              <a:t>;</a:t>
-            </a:r>
-            <a:r>
-              <a:rPr>
-                <a:solidFill>
-                  <a:srgbClr val="000000"/>
-                </a:solidFill>
-              </a:rPr>
-              <a:t> </a:t>
-            </a:r>
-            <a:endParaRPr>
-              <a:solidFill>
-                <a:srgbClr val="000000"/>
-              </a:solidFill>
-            </a:endParaRPr>
-          </a:p>
-          <a:p>
-            <a:pPr marL="438912" indent="-320040" algn="l" defTabSz="914400">
+              <a:t>float, double</a:t>
+            </a:r>
+          </a:p>
+          <a:p>
+            <a:pPr lvl="1" marL="731519" indent="-274319" algn="l" defTabSz="914400">
+              <a:spcBef>
+                <a:spcPts val="600"/>
+              </a:spcBef>
               <a:buClr>
-                <a:srgbClr val="F0AD00"/>
+                <a:srgbClr val="60B5CC"/>
               </a:buClr>
-              <a:buSzPct val="80000"/>
-              <a:buFont typeface="Wingdings 2"/>
-              <a:buChar char="◼"/>
-              <a:defRPr sz="3200">
-                <a:latin typeface="Corbel"/>
-                <a:ea typeface="Corbel"/>
-                <a:cs typeface="Corbel"/>
-                <a:sym typeface="Corbel"/>
+              <a:buSzPct val="90000"/>
+              <a:buFont typeface="Wingdings"/>
+              <a:buChar char="▪"/>
+              <a:defRPr>
+                <a:latin typeface="Arial"/>
+                <a:ea typeface="Arial"/>
+                <a:cs typeface="Arial"/>
+                <a:sym typeface="Arial"/>
               </a:defRPr>
             </a:pPr>
             <a:r>
-              <a:t>short – 16b (-32768 : 32767 )</a:t>
-            </a:r>
-          </a:p>
-          <a:p>
-            <a:pPr marL="320040" indent="-201168" algn="l" defTabSz="914400">
+              <a:t>boolean</a:t>
+            </a:r>
+          </a:p>
+          <a:p>
+            <a:pPr lvl="1" marL="731519" indent="-274319" algn="l" defTabSz="914400">
+              <a:spcBef>
+                <a:spcPts val="600"/>
+              </a:spcBef>
               <a:buClr>
-                <a:srgbClr val="F0AD00"/>
+                <a:srgbClr val="60B5CC"/>
               </a:buClr>
-              <a:buFont typeface="Wingdings 2"/>
-              <a:defRPr sz="3200">
-                <a:solidFill>
-                  <a:srgbClr val="8000FF"/>
-                </a:solidFill>
-                <a:latin typeface="Corbel"/>
-                <a:ea typeface="Corbel"/>
-                <a:cs typeface="Corbel"/>
-                <a:sym typeface="Corbel"/>
+              <a:buSzPct val="90000"/>
+              <a:buFont typeface="Wingdings"/>
+              <a:buChar char="▪"/>
+              <a:defRPr>
+                <a:latin typeface="Arial"/>
+                <a:ea typeface="Arial"/>
+                <a:cs typeface="Arial"/>
+                <a:sym typeface="Arial"/>
               </a:defRPr>
             </a:pPr>
             <a:r>
-              <a:t>		</a:t>
-            </a:r>
-            <a:r>
-              <a:rPr i="1">
-                <a:latin typeface="Courier New"/>
-                <a:ea typeface="Courier New"/>
-                <a:cs typeface="Courier New"/>
-                <a:sym typeface="Courier New"/>
-              </a:rPr>
-              <a:t>short</a:t>
-            </a:r>
-            <a:r>
-              <a:rPr i="1">
-                <a:solidFill>
-                  <a:srgbClr val="000000"/>
-                </a:solidFill>
-                <a:latin typeface="Courier New"/>
-                <a:ea typeface="Courier New"/>
-                <a:cs typeface="Courier New"/>
-                <a:sym typeface="Courier New"/>
-              </a:rPr>
-              <a:t> s </a:t>
-            </a:r>
-            <a:r>
-              <a:rPr b="1" i="1">
-                <a:solidFill>
-                  <a:srgbClr val="000080"/>
-                </a:solidFill>
-                <a:latin typeface="Courier New"/>
-                <a:ea typeface="Courier New"/>
-                <a:cs typeface="Courier New"/>
-                <a:sym typeface="Courier New"/>
-              </a:rPr>
-              <a:t>=</a:t>
-            </a:r>
-            <a:r>
-              <a:rPr b="1" i="1">
-                <a:solidFill>
-                  <a:srgbClr val="000000"/>
-                </a:solidFill>
-                <a:latin typeface="Courier New"/>
-                <a:ea typeface="Courier New"/>
-                <a:cs typeface="Courier New"/>
-                <a:sym typeface="Courier New"/>
-              </a:rPr>
-              <a:t> </a:t>
-            </a:r>
-            <a:r>
-              <a:rPr i="1">
-                <a:solidFill>
-                  <a:srgbClr val="FF8000"/>
-                </a:solidFill>
-                <a:latin typeface="Courier New"/>
-                <a:ea typeface="Courier New"/>
-                <a:cs typeface="Courier New"/>
-                <a:sym typeface="Courier New"/>
-              </a:rPr>
-              <a:t>10000</a:t>
-            </a:r>
-            <a:r>
-              <a:rPr b="1" i="1">
-                <a:solidFill>
-                  <a:srgbClr val="000080"/>
-                </a:solidFill>
-                <a:latin typeface="Courier New"/>
-                <a:ea typeface="Courier New"/>
-                <a:cs typeface="Courier New"/>
-                <a:sym typeface="Courier New"/>
-              </a:rPr>
-              <a:t>;</a:t>
-            </a:r>
-            <a:endParaRPr b="1" i="1">
-              <a:latin typeface="Courier New"/>
-              <a:ea typeface="Courier New"/>
-              <a:cs typeface="Courier New"/>
-              <a:sym typeface="Courier New"/>
-            </a:endParaRPr>
-          </a:p>
-          <a:p>
-            <a:pPr marL="438912" indent="-320040" algn="l" defTabSz="914400">
-              <a:buClr>
-                <a:srgbClr val="F0AD00"/>
-              </a:buClr>
-              <a:buSzPct val="80000"/>
-              <a:buFont typeface="Wingdings 2"/>
-              <a:buChar char="◼"/>
-              <a:defRPr sz="3200">
-                <a:latin typeface="Corbel"/>
-                <a:ea typeface="Corbel"/>
-                <a:cs typeface="Corbel"/>
-                <a:sym typeface="Corbel"/>
-              </a:defRPr>
-            </a:pPr>
-            <a:r>
-              <a:t>int – from integer, 32b (-2^31 : 2^31-1)</a:t>
-            </a:r>
-          </a:p>
-          <a:p>
-            <a:pPr marL="320040" indent="-201168" algn="l" defTabSz="914400">
-              <a:buClr>
-                <a:srgbClr val="F0AD00"/>
-              </a:buClr>
-              <a:buFont typeface="Wingdings 2"/>
-              <a:defRPr sz="3200">
-                <a:solidFill>
-                  <a:srgbClr val="8000FF"/>
-                </a:solidFill>
-                <a:latin typeface="Corbel"/>
-                <a:ea typeface="Corbel"/>
-                <a:cs typeface="Corbel"/>
-                <a:sym typeface="Corbel"/>
-              </a:defRPr>
-            </a:pPr>
-            <a:r>
-              <a:t>		</a:t>
-            </a:r>
-            <a:r>
-              <a:rPr i="1">
-                <a:latin typeface="Courier New"/>
-                <a:ea typeface="Courier New"/>
-                <a:cs typeface="Courier New"/>
-                <a:sym typeface="Courier New"/>
-              </a:rPr>
-              <a:t>int</a:t>
-            </a:r>
-            <a:r>
-              <a:rPr i="1">
-                <a:solidFill>
-                  <a:srgbClr val="000000"/>
-                </a:solidFill>
-                <a:latin typeface="Courier New"/>
-                <a:ea typeface="Courier New"/>
-                <a:cs typeface="Courier New"/>
-                <a:sym typeface="Courier New"/>
-              </a:rPr>
-              <a:t> i </a:t>
-            </a:r>
-            <a:r>
-              <a:rPr b="1" i="1">
-                <a:solidFill>
-                  <a:srgbClr val="000080"/>
-                </a:solidFill>
-                <a:latin typeface="Courier New"/>
-                <a:ea typeface="Courier New"/>
-                <a:cs typeface="Courier New"/>
-                <a:sym typeface="Courier New"/>
-              </a:rPr>
-              <a:t>=</a:t>
-            </a:r>
-            <a:r>
-              <a:rPr b="1" i="1">
-                <a:solidFill>
-                  <a:srgbClr val="000000"/>
-                </a:solidFill>
-                <a:latin typeface="Courier New"/>
-                <a:ea typeface="Courier New"/>
-                <a:cs typeface="Courier New"/>
-                <a:sym typeface="Courier New"/>
-              </a:rPr>
-              <a:t> </a:t>
-            </a:r>
-            <a:r>
-              <a:rPr i="1">
-                <a:solidFill>
-                  <a:srgbClr val="FF8000"/>
-                </a:solidFill>
-                <a:latin typeface="Courier New"/>
-                <a:ea typeface="Courier New"/>
-                <a:cs typeface="Courier New"/>
-                <a:sym typeface="Courier New"/>
-              </a:rPr>
-              <a:t>10000</a:t>
-            </a:r>
-            <a:r>
-              <a:rPr b="1" i="1">
-                <a:solidFill>
-                  <a:srgbClr val="000080"/>
-                </a:solidFill>
-                <a:latin typeface="Courier New"/>
-                <a:ea typeface="Courier New"/>
-                <a:cs typeface="Courier New"/>
-                <a:sym typeface="Courier New"/>
-              </a:rPr>
-              <a:t>;</a:t>
+              <a:t>char</a:t>
             </a:r>
           </a:p>
         </p:txBody>
       </p:sp>
-      <p:sp>
-        <p:nvSpPr>
-          <p:cNvPr id="140" name="Shape 140"/>
-          <p:cNvSpPr/>
+      <p:pic>
+        <p:nvPicPr>
+          <p:cNvPr id="139" name="image1.gif" descr="http://www.ntu.edu.sg/home/ehchua/programming/java/images/Type_Primitive.gif"/>
+          <p:cNvPicPr>
+            <a:picLocks noChangeAspect="1"/>
+          </p:cNvPicPr>
           <p:nvPr/>
-        </p:nvSpPr>
+        </p:nvPicPr>
+        <p:blipFill>
+          <a:blip r:embed="rId2">
+            <a:extLst/>
+          </a:blip>
+          <a:stretch>
+            <a:fillRect/>
+          </a:stretch>
+        </p:blipFill>
         <p:spPr>
           <a:xfrm>
-            <a:off x="949737" y="5873849"/>
-            <a:ext cx="7015926" cy="2450902"/>
+            <a:off x="3218862" y="4178301"/>
+            <a:ext cx="6952782" cy="3682999"/>
           </a:xfrm>
           <a:prstGeom prst="rect">
             <a:avLst/>
@@ -5167,228 +4938,8 @@
           <a:ln w="12700">
             <a:miter lim="400000"/>
           </a:ln>
-          <a:extLst>
-            <a:ext uri="{C572A759-6A51-4108-AA02-DFA0A04FC94B}">
-              <ma14:wrappingTextBoxFlag xmlns:ma14="http://schemas.microsoft.com/office/mac/drawingml/2011/main" val="1"/>
-            </a:ext>
-          </a:extLst>
-        </p:spPr>
-        <p:txBody>
-          <a:bodyPr wrap="none" lIns="50800" tIns="50800" rIns="50800" bIns="50800" anchor="ctr">
-            <a:spAutoFit/>
-          </a:bodyPr>
-          <a:lstStyle/>
-          <a:p>
-            <a:pPr marL="438912" indent="-320040" algn="l" defTabSz="914400">
-              <a:buClr>
-                <a:srgbClr val="F0AD00"/>
-              </a:buClr>
-              <a:buSzPct val="80000"/>
-              <a:buFont typeface="Wingdings 2"/>
-              <a:buChar char="◼"/>
-              <a:defRPr sz="3200">
-                <a:latin typeface="Corbel"/>
-                <a:ea typeface="Corbel"/>
-                <a:cs typeface="Corbel"/>
-                <a:sym typeface="Corbel"/>
-              </a:defRPr>
-            </a:pPr>
-            <a:r>
-              <a:t>char is used for 16b unicode character</a:t>
-            </a:r>
-          </a:p>
-          <a:p>
-            <a:pPr marL="320040" indent="-201168" algn="l" defTabSz="914400">
-              <a:buClr>
-                <a:srgbClr val="F0AD00"/>
-              </a:buClr>
-              <a:buFont typeface="Wingdings 2"/>
-              <a:defRPr sz="3200">
-                <a:latin typeface="Corbel"/>
-                <a:ea typeface="Corbel"/>
-                <a:cs typeface="Corbel"/>
-                <a:sym typeface="Corbel"/>
-              </a:defRPr>
-            </a:pPr>
-            <a:r>
-              <a:t>Char values are embedded in ' '</a:t>
-            </a:r>
-          </a:p>
-          <a:p>
-            <a:pPr marL="320040" indent="-201168" algn="l" defTabSz="914400">
-              <a:buClr>
-                <a:srgbClr val="F0AD00"/>
-              </a:buClr>
-              <a:buFont typeface="Wingdings 2"/>
-              <a:defRPr i="1" sz="3200">
-                <a:solidFill>
-                  <a:srgbClr val="8000FF"/>
-                </a:solidFill>
-                <a:latin typeface="Courier New"/>
-                <a:ea typeface="Courier New"/>
-                <a:cs typeface="Courier New"/>
-                <a:sym typeface="Courier New"/>
-              </a:defRPr>
-            </a:pPr>
-            <a:r>
-              <a:t>	char</a:t>
-            </a:r>
-            <a:r>
-              <a:rPr>
-                <a:solidFill>
-                  <a:srgbClr val="000000"/>
-                </a:solidFill>
-              </a:rPr>
-              <a:t> ch </a:t>
-            </a:r>
-            <a:r>
-              <a:rPr b="1">
-                <a:solidFill>
-                  <a:srgbClr val="000080"/>
-                </a:solidFill>
-              </a:rPr>
-              <a:t>=</a:t>
-            </a:r>
-            <a:r>
-              <a:rPr b="1">
-                <a:solidFill>
-                  <a:srgbClr val="000000"/>
-                </a:solidFill>
-              </a:rPr>
-              <a:t> </a:t>
-            </a:r>
-            <a:r>
-              <a:rPr b="1">
-                <a:solidFill>
-                  <a:srgbClr val="808080"/>
-                </a:solidFill>
-              </a:rPr>
-              <a:t>'c'</a:t>
-            </a:r>
-            <a:r>
-              <a:rPr b="1">
-                <a:solidFill>
-                  <a:srgbClr val="000080"/>
-                </a:solidFill>
-              </a:rPr>
-              <a:t>;</a:t>
-            </a:r>
-            <a:endParaRPr b="1">
-              <a:solidFill>
-                <a:srgbClr val="000080"/>
-              </a:solidFill>
-            </a:endParaRPr>
-          </a:p>
-          <a:p>
-            <a:pPr marL="438912" indent="-320040" algn="l" defTabSz="914400">
-              <a:buClr>
-                <a:srgbClr val="F0AD00"/>
-              </a:buClr>
-              <a:buSzPct val="80000"/>
-              <a:buFont typeface="Wingdings 2"/>
-              <a:buChar char="◼"/>
-              <a:defRPr sz="3200">
-                <a:latin typeface="Corbel"/>
-                <a:ea typeface="Corbel"/>
-                <a:cs typeface="Corbel"/>
-                <a:sym typeface="Corbel"/>
-              </a:defRPr>
-            </a:pPr>
-            <a:r>
-              <a:t>boolean has two values - true or false</a:t>
-            </a:r>
-          </a:p>
-          <a:p>
-            <a:pPr marL="320040" indent="-201168" algn="l" defTabSz="914400">
-              <a:buClr>
-                <a:srgbClr val="F0AD00"/>
-              </a:buClr>
-              <a:buFont typeface="Wingdings 2"/>
-              <a:defRPr sz="3200">
-                <a:solidFill>
-                  <a:srgbClr val="8000FF"/>
-                </a:solidFill>
-                <a:latin typeface="Corbel"/>
-                <a:ea typeface="Corbel"/>
-                <a:cs typeface="Corbel"/>
-                <a:sym typeface="Corbel"/>
-              </a:defRPr>
-            </a:pPr>
-            <a:r>
-              <a:t>	</a:t>
-            </a:r>
-            <a:r>
-              <a:rPr i="1">
-                <a:latin typeface="Courier New"/>
-                <a:ea typeface="Courier New"/>
-                <a:cs typeface="Courier New"/>
-                <a:sym typeface="Courier New"/>
-              </a:rPr>
-              <a:t>boolean</a:t>
-            </a:r>
-            <a:r>
-              <a:rPr i="1">
-                <a:solidFill>
-                  <a:srgbClr val="000000"/>
-                </a:solidFill>
-                <a:latin typeface="Courier New"/>
-                <a:ea typeface="Courier New"/>
-                <a:cs typeface="Courier New"/>
-                <a:sym typeface="Courier New"/>
-              </a:rPr>
-              <a:t> bool </a:t>
-            </a:r>
-            <a:r>
-              <a:rPr b="1" i="1">
-                <a:solidFill>
-                  <a:srgbClr val="000080"/>
-                </a:solidFill>
-                <a:latin typeface="Courier New"/>
-                <a:ea typeface="Courier New"/>
-                <a:cs typeface="Courier New"/>
-                <a:sym typeface="Courier New"/>
-              </a:rPr>
-              <a:t>=</a:t>
-            </a:r>
-            <a:r>
-              <a:rPr b="1" i="1">
-                <a:solidFill>
-                  <a:srgbClr val="000000"/>
-                </a:solidFill>
-                <a:latin typeface="Courier New"/>
-                <a:ea typeface="Courier New"/>
-                <a:cs typeface="Courier New"/>
-                <a:sym typeface="Courier New"/>
-              </a:rPr>
-              <a:t> </a:t>
-            </a:r>
-            <a:r>
-              <a:rPr b="1" i="1">
-                <a:solidFill>
-                  <a:srgbClr val="0000FF"/>
-                </a:solidFill>
-                <a:latin typeface="Courier New"/>
-                <a:ea typeface="Courier New"/>
-                <a:cs typeface="Courier New"/>
-                <a:sym typeface="Courier New"/>
-              </a:rPr>
-              <a:t>false</a:t>
-            </a:r>
-            <a:r>
-              <a:rPr b="1" i="1">
-                <a:solidFill>
-                  <a:srgbClr val="000080"/>
-                </a:solidFill>
-                <a:latin typeface="Courier New"/>
-                <a:ea typeface="Courier New"/>
-                <a:cs typeface="Courier New"/>
-                <a:sym typeface="Courier New"/>
-              </a:rPr>
-              <a:t>;</a:t>
-            </a:r>
-          </a:p>
-        </p:txBody>
-      </p:sp>
+        </p:spPr>
+      </p:pic>
     </p:spTree>
   </p:cSld>
   <p:clrMapOvr>
@@ -5417,7 +4968,7 @@
       </p:grpSpPr>
       <p:sp>
         <p:nvSpPr>
-          <p:cNvPr id="142" name="Shape 142"/>
+          <p:cNvPr id="141" name="Shape 141"/>
           <p:cNvSpPr/>
           <p:nvPr>
             <p:ph type="title"/>
@@ -5434,98 +4985,21 @@
           <a:p>
             <a:pPr/>
             <a:r>
-              <a:t>Default values</a:t>
+              <a:t>Primitive Types size</a:t>
             </a:r>
           </a:p>
         </p:txBody>
       </p:sp>
       <p:sp>
         <p:nvSpPr>
-          <p:cNvPr id="143" name="Shape 143"/>
-          <p:cNvSpPr/>
-          <p:nvPr>
-            <p:ph type="body" sz="quarter" idx="1"/>
-          </p:nvPr>
-        </p:nvSpPr>
-        <p:spPr>
-          <a:xfrm>
-            <a:off x="2095500" y="2434335"/>
-            <a:ext cx="4038600" cy="4623817"/>
-          </a:xfrm>
-          <a:prstGeom prst="rect">
-            <a:avLst/>
-          </a:prstGeom>
-        </p:spPr>
-        <p:txBody>
-          <a:bodyPr lIns="45719" tIns="45719" rIns="45719" bIns="45719" anchor="t"/>
-          <a:lstStyle/>
-          <a:p>
-            <a:pPr marL="320040" indent="-201168" defTabSz="914400">
-              <a:spcBef>
-                <a:spcPts val="0"/>
-              </a:spcBef>
-              <a:buClr>
-                <a:srgbClr val="F0AD00"/>
-              </a:buClr>
-              <a:buSzTx/>
-              <a:buFont typeface="Wingdings 2"/>
-              <a:buNone/>
-              <a:defRPr sz="2800">
-                <a:latin typeface="Arial"/>
-                <a:ea typeface="Arial"/>
-                <a:cs typeface="Arial"/>
-                <a:sym typeface="Arial"/>
-              </a:defRPr>
-            </a:pPr>
-            <a:r>
-              <a:t>Data type</a:t>
-            </a:r>
-            <a:br/>
-            <a:r>
-              <a:t>● byte</a:t>
-            </a:r>
-            <a:br/>
-            <a:r>
-              <a:t>● short</a:t>
-            </a:r>
-            <a:br/>
-            <a:r>
-              <a:t>● int</a:t>
-            </a:r>
-            <a:br/>
-            <a:r>
-              <a:t>● long</a:t>
-            </a:r>
-            <a:br/>
-            <a:r>
-              <a:t>● float</a:t>
-            </a:r>
-            <a:br/>
-            <a:r>
-              <a:t>● double</a:t>
-            </a:r>
-            <a:br/>
-            <a:r>
-              <a:t>● char</a:t>
-            </a:r>
-            <a:br/>
-            <a:r>
-              <a:t>● boolean</a:t>
-            </a:r>
-            <a:br/>
-          </a:p>
-        </p:txBody>
-      </p:sp>
-      <p:sp>
-        <p:nvSpPr>
-          <p:cNvPr id="144" name="Shape 144"/>
+          <p:cNvPr id="142" name="Shape 142"/>
           <p:cNvSpPr/>
           <p:nvPr/>
         </p:nvSpPr>
         <p:spPr>
           <a:xfrm>
-            <a:off x="6286500" y="2434335"/>
-            <a:ext cx="4038600" cy="3737408"/>
+            <a:off x="939800" y="2324099"/>
+            <a:ext cx="9144000" cy="3431141"/>
           </a:xfrm>
           <a:prstGeom prst="rect">
             <a:avLst/>
@@ -5540,53 +5014,550 @@
           </a:extLst>
         </p:spPr>
         <p:txBody>
-          <a:bodyPr lIns="45719" rIns="45719">
+          <a:bodyPr lIns="45718" tIns="45718" rIns="45718" bIns="45718">
             <a:normAutofit fontScale="100000" lnSpcReduction="0"/>
           </a:bodyPr>
           <a:lstStyle/>
           <a:p>
-            <a:pPr marL="320040" indent="-201168" algn="l" defTabSz="914400">
-              <a:defRPr sz="2800">
-                <a:latin typeface="Arial"/>
-                <a:ea typeface="Arial"/>
-                <a:cs typeface="Arial"/>
-                <a:sym typeface="Arial"/>
+            <a:pPr marL="438912" indent="-320040" algn="l" defTabSz="914400">
+              <a:buClr>
+                <a:srgbClr val="F0AD00"/>
+              </a:buClr>
+              <a:buSzPct val="80000"/>
+              <a:buFont typeface="Wingdings 2"/>
+              <a:buChar char="◼"/>
+              <a:defRPr sz="3200">
+                <a:latin typeface="Corbel"/>
+                <a:ea typeface="Corbel"/>
+                <a:cs typeface="Corbel"/>
+                <a:sym typeface="Corbel"/>
               </a:defRPr>
             </a:pPr>
             <a:r>
-              <a:t>Default value</a:t>
-            </a:r>
-            <a:br/>
-            <a:r>
-              <a:t>0</a:t>
-            </a:r>
-            <a:br/>
-            <a:r>
-              <a:t>0</a:t>
-            </a:r>
-            <a:br/>
-            <a:r>
-              <a:t>0</a:t>
-            </a:r>
-            <a:br/>
-            <a:r>
-              <a:t>0</a:t>
-            </a:r>
-            <a:br/>
-            <a:r>
-              <a:t>0.0</a:t>
-            </a:r>
-            <a:br/>
-            <a:r>
-              <a:t>0.0</a:t>
-            </a:r>
-            <a:br/>
-            <a:r>
-              <a:t>'u\0000'</a:t>
-            </a:r>
-            <a:br/>
-            <a:r>
+              <a:t>Numeric types are byte, short, long, int, double, float</a:t>
+            </a:r>
+          </a:p>
+          <a:p>
+            <a:pPr marL="438912" indent="-320040" algn="l" defTabSz="914400">
+              <a:buClr>
+                <a:srgbClr val="F0AD00"/>
+              </a:buClr>
+              <a:buSzPct val="80000"/>
+              <a:buFont typeface="Wingdings 2"/>
+              <a:buChar char="◼"/>
+              <a:defRPr sz="3200">
+                <a:latin typeface="Corbel"/>
+                <a:ea typeface="Corbel"/>
+                <a:cs typeface="Corbel"/>
+                <a:sym typeface="Corbel"/>
+              </a:defRPr>
+            </a:pPr>
+            <a:r>
+              <a:t>byte – 8b (-128 : 127)</a:t>
+            </a:r>
+          </a:p>
+          <a:p>
+            <a:pPr marL="82295" indent="36577" algn="l" defTabSz="914400">
+              <a:defRPr sz="3200">
+                <a:solidFill>
+                  <a:srgbClr val="8000FF"/>
+                </a:solidFill>
+                <a:latin typeface="Courier New"/>
+                <a:ea typeface="Courier New"/>
+                <a:cs typeface="Courier New"/>
+                <a:sym typeface="Courier New"/>
+              </a:defRPr>
+            </a:pPr>
+            <a:r>
+              <a:t>		</a:t>
+            </a:r>
+            <a:r>
+              <a:rPr i="1"/>
+              <a:t>byte</a:t>
+            </a:r>
+            <a:r>
+              <a:rPr i="1">
+                <a:solidFill>
+                  <a:srgbClr val="000000"/>
+                </a:solidFill>
+              </a:rPr>
+              <a:t> b </a:t>
+            </a:r>
+            <a:r>
+              <a:rPr b="1" i="1">
+                <a:solidFill>
+                  <a:srgbClr val="000080"/>
+                </a:solidFill>
+              </a:rPr>
+              <a:t>=</a:t>
+            </a:r>
+            <a:r>
+              <a:rPr i="1">
+                <a:solidFill>
+                  <a:srgbClr val="000000"/>
+                </a:solidFill>
+              </a:rPr>
+              <a:t> </a:t>
+            </a:r>
+            <a:r>
+              <a:rPr i="1">
+                <a:solidFill>
+                  <a:srgbClr val="FF8000"/>
+                </a:solidFill>
+              </a:rPr>
+              <a:t>100</a:t>
+            </a:r>
+            <a:r>
+              <a:rPr b="1" i="1">
+                <a:solidFill>
+                  <a:srgbClr val="000080"/>
+                </a:solidFill>
+              </a:rPr>
+              <a:t>;</a:t>
+            </a:r>
+            <a:r>
+              <a:rPr>
+                <a:solidFill>
+                  <a:srgbClr val="000000"/>
+                </a:solidFill>
+              </a:rPr>
+              <a:t> </a:t>
+            </a:r>
+          </a:p>
+          <a:p>
+            <a:pPr marL="438912" indent="-320040" algn="l" defTabSz="914400">
+              <a:buClr>
+                <a:srgbClr val="F0AD00"/>
+              </a:buClr>
+              <a:buSzPct val="80000"/>
+              <a:buFont typeface="Wingdings 2"/>
+              <a:buChar char="◼"/>
+              <a:defRPr sz="3200">
+                <a:latin typeface="Corbel"/>
+                <a:ea typeface="Corbel"/>
+                <a:cs typeface="Corbel"/>
+                <a:sym typeface="Corbel"/>
+              </a:defRPr>
+            </a:pPr>
+            <a:r>
+              <a:t>short – 16b (-32768 : 32767 )</a:t>
+            </a:r>
+          </a:p>
+          <a:p>
+            <a:pPr marL="82295" indent="36577" algn="l" defTabSz="914400">
+              <a:defRPr sz="3200">
+                <a:solidFill>
+                  <a:srgbClr val="8000FF"/>
+                </a:solidFill>
+                <a:latin typeface="Corbel"/>
+                <a:ea typeface="Corbel"/>
+                <a:cs typeface="Corbel"/>
+                <a:sym typeface="Corbel"/>
+              </a:defRPr>
+            </a:pPr>
+            <a:r>
+              <a:t>		</a:t>
+            </a:r>
+            <a:r>
+              <a:rPr i="1">
+                <a:latin typeface="Courier New"/>
+                <a:ea typeface="Courier New"/>
+                <a:cs typeface="Courier New"/>
+                <a:sym typeface="Courier New"/>
+              </a:rPr>
+              <a:t>short</a:t>
+            </a:r>
+            <a:r>
+              <a:rPr i="1">
+                <a:solidFill>
+                  <a:srgbClr val="000000"/>
+                </a:solidFill>
+                <a:latin typeface="Courier New"/>
+                <a:ea typeface="Courier New"/>
+                <a:cs typeface="Courier New"/>
+                <a:sym typeface="Courier New"/>
+              </a:rPr>
+              <a:t> s </a:t>
+            </a:r>
+            <a:r>
+              <a:rPr b="1" i="1">
+                <a:solidFill>
+                  <a:srgbClr val="000080"/>
+                </a:solidFill>
+                <a:latin typeface="Courier New"/>
+                <a:ea typeface="Courier New"/>
+                <a:cs typeface="Courier New"/>
+                <a:sym typeface="Courier New"/>
+              </a:rPr>
+              <a:t>=</a:t>
+            </a:r>
+            <a:r>
+              <a:rPr b="1" i="1">
+                <a:solidFill>
+                  <a:srgbClr val="000000"/>
+                </a:solidFill>
+                <a:latin typeface="Courier New"/>
+                <a:ea typeface="Courier New"/>
+                <a:cs typeface="Courier New"/>
+                <a:sym typeface="Courier New"/>
+              </a:rPr>
+              <a:t> </a:t>
+            </a:r>
+            <a:r>
+              <a:rPr i="1">
+                <a:solidFill>
+                  <a:srgbClr val="FF8000"/>
+                </a:solidFill>
+                <a:latin typeface="Courier New"/>
+                <a:ea typeface="Courier New"/>
+                <a:cs typeface="Courier New"/>
+                <a:sym typeface="Courier New"/>
+              </a:rPr>
+              <a:t>10000</a:t>
+            </a:r>
+            <a:r>
+              <a:rPr b="1" i="1">
+                <a:solidFill>
+                  <a:srgbClr val="000080"/>
+                </a:solidFill>
+                <a:latin typeface="Courier New"/>
+                <a:ea typeface="Courier New"/>
+                <a:cs typeface="Courier New"/>
+                <a:sym typeface="Courier New"/>
+              </a:rPr>
+              <a:t>;</a:t>
+            </a:r>
+            <a:endParaRPr i="1"/>
+          </a:p>
+          <a:p>
+            <a:pPr marL="438912" indent="-320040" algn="l" defTabSz="914400">
+              <a:buClr>
+                <a:srgbClr val="F0AD00"/>
+              </a:buClr>
+              <a:buSzPct val="80000"/>
+              <a:buFont typeface="Wingdings 2"/>
+              <a:buChar char="◼"/>
+              <a:defRPr sz="3200">
+                <a:latin typeface="Corbel"/>
+                <a:ea typeface="Corbel"/>
+                <a:cs typeface="Corbel"/>
+                <a:sym typeface="Corbel"/>
+              </a:defRPr>
+            </a:pPr>
+            <a:r>
+              <a:t>int – from integer, 32b (-2^31 : 2^31-1)</a:t>
+            </a:r>
+          </a:p>
+          <a:p>
+            <a:pPr marL="82295" indent="36577" algn="l" defTabSz="914400">
+              <a:defRPr sz="3200">
+                <a:solidFill>
+                  <a:srgbClr val="8000FF"/>
+                </a:solidFill>
+                <a:latin typeface="Corbel"/>
+                <a:ea typeface="Corbel"/>
+                <a:cs typeface="Corbel"/>
+                <a:sym typeface="Corbel"/>
+              </a:defRPr>
+            </a:pPr>
+            <a:r>
+              <a:t>		</a:t>
+            </a:r>
+            <a:r>
+              <a:rPr i="1">
+                <a:latin typeface="Courier New"/>
+                <a:ea typeface="Courier New"/>
+                <a:cs typeface="Courier New"/>
+                <a:sym typeface="Courier New"/>
+              </a:rPr>
+              <a:t>int</a:t>
+            </a:r>
+            <a:r>
+              <a:rPr i="1">
+                <a:solidFill>
+                  <a:srgbClr val="000000"/>
+                </a:solidFill>
+                <a:latin typeface="Courier New"/>
+                <a:ea typeface="Courier New"/>
+                <a:cs typeface="Courier New"/>
+                <a:sym typeface="Courier New"/>
+              </a:rPr>
+              <a:t> i </a:t>
+            </a:r>
+            <a:r>
+              <a:rPr b="1" i="1">
+                <a:solidFill>
+                  <a:srgbClr val="000080"/>
+                </a:solidFill>
+                <a:latin typeface="Courier New"/>
+                <a:ea typeface="Courier New"/>
+                <a:cs typeface="Courier New"/>
+                <a:sym typeface="Courier New"/>
+              </a:rPr>
+              <a:t>=</a:t>
+            </a:r>
+            <a:r>
+              <a:rPr b="1" i="1">
+                <a:solidFill>
+                  <a:srgbClr val="000000"/>
+                </a:solidFill>
+                <a:latin typeface="Courier New"/>
+                <a:ea typeface="Courier New"/>
+                <a:cs typeface="Courier New"/>
+                <a:sym typeface="Courier New"/>
+              </a:rPr>
+              <a:t> </a:t>
+            </a:r>
+            <a:r>
+              <a:rPr i="1">
+                <a:solidFill>
+                  <a:srgbClr val="FF8000"/>
+                </a:solidFill>
+                <a:latin typeface="Courier New"/>
+                <a:ea typeface="Courier New"/>
+                <a:cs typeface="Courier New"/>
+                <a:sym typeface="Courier New"/>
+              </a:rPr>
+              <a:t>10000</a:t>
+            </a:r>
+            <a:r>
+              <a:rPr b="1" i="1">
+                <a:solidFill>
+                  <a:srgbClr val="000080"/>
+                </a:solidFill>
+                <a:latin typeface="Courier New"/>
+                <a:ea typeface="Courier New"/>
+                <a:cs typeface="Courier New"/>
+                <a:sym typeface="Courier New"/>
+              </a:rPr>
+              <a:t>;</a:t>
+            </a:r>
+          </a:p>
+        </p:txBody>
+      </p:sp>
+      <p:sp>
+        <p:nvSpPr>
+          <p:cNvPr id="143" name="Shape 143"/>
+          <p:cNvSpPr/>
+          <p:nvPr/>
+        </p:nvSpPr>
+        <p:spPr>
+          <a:xfrm>
+            <a:off x="949736" y="5861148"/>
+            <a:ext cx="6798636" cy="2476303"/>
+          </a:xfrm>
+          <a:prstGeom prst="rect">
+            <a:avLst/>
+          </a:prstGeom>
+          <a:ln w="12700">
+            <a:miter lim="400000"/>
+          </a:ln>
+          <a:extLst>
+            <a:ext uri="{C572A759-6A51-4108-AA02-DFA0A04FC94B}">
+              <ma14:wrappingTextBoxFlag xmlns:ma14="http://schemas.microsoft.com/office/mac/drawingml/2011/main" val="1"/>
+            </a:ext>
+          </a:extLst>
+        </p:spPr>
+        <p:txBody>
+          <a:bodyPr wrap="none" lIns="50800" tIns="50800" rIns="50800" bIns="50800" anchor="ctr">
+            <a:spAutoFit/>
+          </a:bodyPr>
+          <a:lstStyle/>
+          <a:p>
+            <a:pPr marL="438912" indent="-320040" algn="l" defTabSz="914400">
+              <a:buClr>
+                <a:srgbClr val="F0AD00"/>
+              </a:buClr>
+              <a:buSzPct val="80000"/>
+              <a:buFont typeface="Wingdings 2"/>
+              <a:buChar char="◼"/>
+              <a:defRPr sz="3200">
+                <a:latin typeface="Corbel"/>
+                <a:ea typeface="Corbel"/>
+                <a:cs typeface="Corbel"/>
+                <a:sym typeface="Corbel"/>
+              </a:defRPr>
+            </a:pPr>
+            <a:r>
+              <a:t>char is used for 16b unicode character</a:t>
+            </a:r>
+          </a:p>
+          <a:p>
+            <a:pPr marL="82295" indent="36577" algn="l" defTabSz="914400">
+              <a:defRPr sz="3200">
+                <a:latin typeface="Corbel"/>
+                <a:ea typeface="Corbel"/>
+                <a:cs typeface="Corbel"/>
+                <a:sym typeface="Corbel"/>
+              </a:defRPr>
+            </a:pPr>
+            <a:r>
+              <a:t>Char values are embedded in ' '</a:t>
+            </a:r>
+          </a:p>
+          <a:p>
+            <a:pPr marL="82295" indent="36577" algn="l" defTabSz="914400">
+              <a:defRPr i="1" sz="3200">
+                <a:solidFill>
+                  <a:srgbClr val="8000FF"/>
+                </a:solidFill>
+                <a:latin typeface="Courier New"/>
+                <a:ea typeface="Courier New"/>
+                <a:cs typeface="Courier New"/>
+                <a:sym typeface="Courier New"/>
+              </a:defRPr>
+            </a:pPr>
+            <a:r>
+              <a:t>	char</a:t>
+            </a:r>
+            <a:r>
+              <a:rPr>
+                <a:solidFill>
+                  <a:srgbClr val="000000"/>
+                </a:solidFill>
+              </a:rPr>
+              <a:t> ch </a:t>
+            </a:r>
+            <a:r>
+              <a:rPr b="1">
+                <a:solidFill>
+                  <a:srgbClr val="000080"/>
+                </a:solidFill>
+              </a:rPr>
+              <a:t>=</a:t>
+            </a:r>
+            <a:r>
+              <a:rPr b="1">
+                <a:solidFill>
+                  <a:srgbClr val="000000"/>
+                </a:solidFill>
+              </a:rPr>
+              <a:t> </a:t>
+            </a:r>
+            <a:r>
+              <a:rPr b="1">
+                <a:solidFill>
+                  <a:srgbClr val="808080"/>
+                </a:solidFill>
+              </a:rPr>
+              <a:t>'c'</a:t>
+            </a:r>
+            <a:r>
+              <a:rPr b="1">
+                <a:solidFill>
+                  <a:srgbClr val="000080"/>
+                </a:solidFill>
+              </a:rPr>
+              <a:t>;</a:t>
+            </a:r>
+            <a:endParaRPr b="1">
+              <a:solidFill>
+                <a:srgbClr val="000080"/>
+              </a:solidFill>
+            </a:endParaRPr>
+          </a:p>
+          <a:p>
+            <a:pPr marL="438912" indent="-320040" algn="l" defTabSz="914400">
+              <a:buClr>
+                <a:srgbClr val="F0AD00"/>
+              </a:buClr>
+              <a:buSzPct val="80000"/>
+              <a:buFont typeface="Wingdings 2"/>
+              <a:buChar char="◼"/>
+              <a:defRPr sz="3200">
+                <a:latin typeface="Corbel"/>
+                <a:ea typeface="Corbel"/>
+                <a:cs typeface="Corbel"/>
+                <a:sym typeface="Corbel"/>
+              </a:defRPr>
+            </a:pPr>
+            <a:r>
+              <a:t>boolean has two values - true or false</a:t>
+            </a:r>
+          </a:p>
+          <a:p>
+            <a:pPr marL="82295" indent="36577" algn="l" defTabSz="914400">
+              <a:defRPr sz="3200">
+                <a:solidFill>
+                  <a:srgbClr val="8000FF"/>
+                </a:solidFill>
+                <a:latin typeface="Corbel"/>
+                <a:ea typeface="Corbel"/>
+                <a:cs typeface="Corbel"/>
+                <a:sym typeface="Corbel"/>
+              </a:defRPr>
+            </a:pPr>
+            <a:r>
+              <a:t>	</a:t>
+            </a:r>
+            <a:r>
+              <a:rPr i="1">
+                <a:latin typeface="Courier New"/>
+                <a:ea typeface="Courier New"/>
+                <a:cs typeface="Courier New"/>
+                <a:sym typeface="Courier New"/>
+              </a:rPr>
+              <a:t>boolean</a:t>
+            </a:r>
+            <a:r>
+              <a:rPr i="1">
+                <a:solidFill>
+                  <a:srgbClr val="000000"/>
+                </a:solidFill>
+                <a:latin typeface="Courier New"/>
+                <a:ea typeface="Courier New"/>
+                <a:cs typeface="Courier New"/>
+                <a:sym typeface="Courier New"/>
+              </a:rPr>
+              <a:t> bool </a:t>
+            </a:r>
+            <a:r>
+              <a:rPr b="1" i="1">
+                <a:solidFill>
+                  <a:srgbClr val="000080"/>
+                </a:solidFill>
+                <a:latin typeface="Courier New"/>
+                <a:ea typeface="Courier New"/>
+                <a:cs typeface="Courier New"/>
+                <a:sym typeface="Courier New"/>
+              </a:rPr>
+              <a:t>=</a:t>
+            </a:r>
+            <a:r>
+              <a:rPr b="1" i="1">
+                <a:solidFill>
+                  <a:srgbClr val="000000"/>
+                </a:solidFill>
+                <a:latin typeface="Courier New"/>
+                <a:ea typeface="Courier New"/>
+                <a:cs typeface="Courier New"/>
+                <a:sym typeface="Courier New"/>
+              </a:rPr>
+              <a:t> </a:t>
+            </a:r>
+            <a:r>
+              <a:rPr b="1" i="1">
+                <a:solidFill>
+                  <a:srgbClr val="0000FF"/>
+                </a:solidFill>
+                <a:latin typeface="Courier New"/>
+                <a:ea typeface="Courier New"/>
+                <a:cs typeface="Courier New"/>
+                <a:sym typeface="Courier New"/>
+              </a:rPr>
               <a:t>false</a:t>
+            </a:r>
+            <a:r>
+              <a:rPr b="1" i="1">
+                <a:solidFill>
+                  <a:srgbClr val="000080"/>
+                </a:solidFill>
+                <a:latin typeface="Courier New"/>
+                <a:ea typeface="Courier New"/>
+                <a:cs typeface="Courier New"/>
+                <a:sym typeface="Courier New"/>
+              </a:rPr>
+              <a:t>;</a:t>
             </a:r>
           </a:p>
         </p:txBody>
@@ -5617,26 +5588,113 @@
           <a:chExt cx="0" cy="0"/>
         </a:xfrm>
       </p:grpSpPr>
-      <p:pic>
-        <p:nvPicPr>
-          <p:cNvPr id="146" name="image5.png" descr="http://4.bp.blogspot.com/-gvckZxbneSQ/TyYv6-iwsTI/AAAAAAAAAAc/BCmKTFbyeZw/s1600/Arithmetic+Operators.PNG"/>
-          <p:cNvPicPr>
-            <a:picLocks noChangeAspect="1"/>
-          </p:cNvPicPr>
+      <p:sp>
+        <p:nvSpPr>
+          <p:cNvPr id="145" name="Shape 145"/>
+          <p:cNvSpPr/>
+          <p:nvPr>
+            <p:ph type="title"/>
+          </p:nvPr>
+        </p:nvSpPr>
+        <p:spPr>
+          <a:prstGeom prst="rect">
+            <a:avLst/>
+          </a:prstGeom>
+        </p:spPr>
+        <p:txBody>
+          <a:bodyPr/>
+          <a:lstStyle/>
+          <a:p>
+            <a:pPr/>
+            <a:r>
+              <a:t>Default values</a:t>
+            </a:r>
+          </a:p>
+        </p:txBody>
+      </p:sp>
+      <p:sp>
+        <p:nvSpPr>
+          <p:cNvPr id="146" name="Shape 146"/>
+          <p:cNvSpPr/>
+          <p:nvPr>
+            <p:ph type="body" sz="quarter" idx="1"/>
+          </p:nvPr>
+        </p:nvSpPr>
+        <p:spPr>
+          <a:xfrm>
+            <a:off x="2095500" y="2434333"/>
+            <a:ext cx="4038600" cy="4623820"/>
+          </a:xfrm>
+          <a:prstGeom prst="rect">
+            <a:avLst/>
+          </a:prstGeom>
+        </p:spPr>
+        <p:txBody>
+          <a:bodyPr lIns="45718" tIns="45718" rIns="45718" bIns="45718" anchor="t"/>
+          <a:lstStyle/>
+          <a:p>
+            <a:pPr marL="82295" indent="36577" defTabSz="914400">
+              <a:spcBef>
+                <a:spcPts val="0"/>
+              </a:spcBef>
+              <a:buSzTx/>
+              <a:buNone/>
+              <a:defRPr sz="2800">
+                <a:latin typeface="Arial"/>
+                <a:ea typeface="Arial"/>
+                <a:cs typeface="Arial"/>
+                <a:sym typeface="Arial"/>
+              </a:defRPr>
+            </a:pPr>
+            <a:r>
+              <a:t>Data type</a:t>
+            </a:r>
+            <a:br/>
+            <a:r>
+              <a:t>● byte</a:t>
+            </a:r>
+            <a:br/>
+            <a:r>
+              <a:t>● short</a:t>
+            </a:r>
+            <a:br/>
+            <a:r>
+              <a:t>● int</a:t>
+            </a:r>
+            <a:br/>
+            <a:r>
+              <a:t>● long</a:t>
+            </a:r>
+            <a:br/>
+            <a:r>
+              <a:t>● float</a:t>
+            </a:r>
+            <a:br/>
+            <a:r>
+              <a:t>● double</a:t>
+            </a:r>
+            <a:br/>
+            <a:r>
+              <a:t>● char</a:t>
+            </a:r>
+            <a:br/>
+            <a:r>
+              <a:t>● boolean</a:t>
+            </a:r>
+            <a:br/>
+          </a:p>
+        </p:txBody>
+      </p:sp>
+      <p:sp>
+        <p:nvSpPr>
+          <p:cNvPr id="147" name="Shape 147"/>
+          <p:cNvSpPr/>
           <p:nvPr/>
-        </p:nvPicPr>
-        <p:blipFill>
-          <a:blip r:embed="rId2">
-            <a:extLst/>
-          </a:blip>
-          <a:stretch>
-            <a:fillRect/>
-          </a:stretch>
-        </p:blipFill>
+        </p:nvSpPr>
         <p:spPr>
           <a:xfrm>
-            <a:off x="-101601" y="-232876"/>
-            <a:ext cx="13207831" cy="9913756"/>
+            <a:off x="6286500" y="2434333"/>
+            <a:ext cx="4038600" cy="3737404"/>
           </a:xfrm>
           <a:prstGeom prst="rect">
             <a:avLst/>
@@ -5644,8 +5702,64 @@
           <a:ln w="12700">
             <a:miter lim="400000"/>
           </a:ln>
-        </p:spPr>
-      </p:pic>
+          <a:extLst>
+            <a:ext uri="{C572A759-6A51-4108-AA02-DFA0A04FC94B}">
+              <ma14:wrappingTextBoxFlag xmlns:ma14="http://schemas.microsoft.com/office/mac/drawingml/2011/main" val="1"/>
+            </a:ext>
+          </a:extLst>
+        </p:spPr>
+        <p:txBody>
+          <a:bodyPr lIns="45718" tIns="45718" rIns="45718" bIns="45718">
+            <a:normAutofit fontScale="100000" lnSpcReduction="0"/>
+          </a:bodyPr>
+          <a:lstStyle/>
+          <a:p>
+            <a:pPr marL="82295" indent="36577" algn="l" defTabSz="914400">
+              <a:defRPr sz="2800">
+                <a:latin typeface="Arial"/>
+                <a:ea typeface="Arial"/>
+                <a:cs typeface="Arial"/>
+                <a:sym typeface="Arial"/>
+              </a:defRPr>
+            </a:pPr>
+            <a:r>
+              <a:t>Default value</a:t>
+            </a:r>
+            <a:br/>
+            <a:r>
+              <a:t>0</a:t>
+            </a:r>
+            <a:br/>
+            <a:r>
+              <a:t>0</a:t>
+            </a:r>
+            <a:br/>
+            <a:r>
+              <a:t>0</a:t>
+            </a:r>
+            <a:br/>
+            <a:r>
+              <a:t>0</a:t>
+            </a:r>
+            <a:br/>
+            <a:r>
+              <a:t>0.0</a:t>
+            </a:r>
+            <a:br/>
+            <a:r>
+              <a:t>0.0</a:t>
+            </a:r>
+            <a:br/>
+            <a:r>
+              <a:t>‘\u0000'</a:t>
+            </a:r>
+            <a:br/>
+            <a:r>
+              <a:t>false</a:t>
+            </a:r>
+          </a:p>
+        </p:txBody>
+      </p:sp>
     </p:spTree>
   </p:cSld>
   <p:clrMapOvr>
@@ -5672,54 +5786,35 @@
           <a:chExt cx="0" cy="0"/>
         </a:xfrm>
       </p:grpSpPr>
-      <p:sp>
-        <p:nvSpPr>
-          <p:cNvPr id="148" name="Shape 148"/>
-          <p:cNvSpPr/>
-          <p:nvPr>
-            <p:ph type="title"/>
-          </p:nvPr>
-        </p:nvSpPr>
-        <p:spPr>
-          <a:prstGeom prst="rect">
-            <a:avLst/>
-          </a:prstGeom>
-        </p:spPr>
-        <p:txBody>
-          <a:bodyPr/>
-          <a:lstStyle/>
-          <a:p>
-            <a:pPr/>
-            <a:r>
-              <a:t>Control Flow</a:t>
-            </a:r>
-          </a:p>
-        </p:txBody>
-      </p:sp>
-      <p:sp>
-        <p:nvSpPr>
-          <p:cNvPr id="149" name="Shape 149"/>
-          <p:cNvSpPr/>
-          <p:nvPr>
-            <p:ph type="body" idx="1"/>
-          </p:nvPr>
-        </p:nvSpPr>
-        <p:spPr>
-          <a:prstGeom prst="rect">
-            <a:avLst/>
-          </a:prstGeom>
-        </p:spPr>
-        <p:txBody>
-          <a:bodyPr/>
-          <a:lstStyle/>
-          <a:p>
-            <a:pPr/>
-            <a:r>
-              <a:t>if, else, else if, switch, ?</a:t>
-            </a:r>
-          </a:p>
-        </p:txBody>
-      </p:sp>
+      <p:pic>
+        <p:nvPicPr>
+          <p:cNvPr id="149" name="image1.png" descr="http://4.bp.blogspot.com/-gvckZxbneSQ/TyYv6-iwsTI/AAAAAAAAAAc/BCmKTFbyeZw/s1600/Arithmetic+Operators.PNG"/>
+          <p:cNvPicPr>
+            <a:picLocks noChangeAspect="1"/>
+          </p:cNvPicPr>
+          <p:nvPr/>
+        </p:nvPicPr>
+        <p:blipFill>
+          <a:blip r:embed="rId2">
+            <a:extLst/>
+          </a:blip>
+          <a:stretch>
+            <a:fillRect/>
+          </a:stretch>
+        </p:blipFill>
+        <p:spPr>
+          <a:xfrm>
+            <a:off x="-101602" y="-232876"/>
+            <a:ext cx="13207833" cy="9913757"/>
+          </a:xfrm>
+          <a:prstGeom prst="rect">
+            <a:avLst/>
+          </a:prstGeom>
+          <a:ln w="12700">
+            <a:miter lim="400000"/>
+          </a:ln>
+        </p:spPr>
+      </p:pic>
     </p:spTree>
   </p:cSld>
   <p:clrMapOvr>
@@ -5761,15 +5856,11 @@
         </p:spPr>
         <p:txBody>
           <a:bodyPr/>
-          <a:lstStyle>
-            <a:lvl1pPr defTabSz="490727">
-              <a:defRPr sz="6719"/>
-            </a:lvl1pPr>
-          </a:lstStyle>
+          <a:lstStyle/>
           <a:p>
             <a:pPr/>
             <a:r>
-              <a:t>Conditional Statements &amp; Unary Operator</a:t>
+              <a:t>Control Flow</a:t>
             </a:r>
           </a:p>
         </p:txBody>
@@ -5788,139 +5879,16 @@
           </a:prstGeom>
         </p:spPr>
         <p:txBody>
-          <a:bodyPr anchor="t"/>
+          <a:bodyPr/>
           <a:lstStyle/>
           <a:p>
-            <a:pPr marL="438912" indent="-320040" defTabSz="914400">
-              <a:spcBef>
-                <a:spcPts val="0"/>
-              </a:spcBef>
-              <a:buClr>
-                <a:srgbClr val="F0AD00"/>
-              </a:buClr>
-              <a:buSzPct val="80000"/>
-              <a:buFont typeface="Wingdings 2"/>
-              <a:buChar char="◼"/>
-              <a:defRPr sz="3200">
-                <a:latin typeface="Arial"/>
-                <a:ea typeface="Arial"/>
-                <a:cs typeface="Arial"/>
-                <a:sym typeface="Arial"/>
-              </a:defRPr>
-            </a:pPr>
-            <a:r>
-              <a:t>Unary NOT operator  </a:t>
-            </a:r>
-            <a:r>
-              <a:rPr>
-                <a:solidFill>
-                  <a:srgbClr val="00B0F0"/>
-                </a:solidFill>
-              </a:rPr>
-              <a:t>!</a:t>
-            </a:r>
-            <a:endParaRPr>
-              <a:solidFill>
-                <a:srgbClr val="00B0F0"/>
-              </a:solidFill>
-            </a:endParaRPr>
-          </a:p>
-          <a:p>
-            <a:pPr marL="438912" indent="-320040" defTabSz="914400">
-              <a:spcBef>
-                <a:spcPts val="0"/>
-              </a:spcBef>
-              <a:buClr>
-                <a:srgbClr val="F0AD00"/>
-              </a:buClr>
-              <a:buSzPct val="80000"/>
-              <a:buFont typeface="Wingdings 2"/>
-              <a:buChar char="◼"/>
-              <a:defRPr sz="3200">
-                <a:latin typeface="Arial"/>
-                <a:ea typeface="Arial"/>
-                <a:cs typeface="Arial"/>
-                <a:sym typeface="Arial"/>
-              </a:defRPr>
-            </a:pPr>
-            <a:r>
-              <a:t>Conditional AND  </a:t>
-            </a:r>
-            <a:r>
-              <a:rPr>
-                <a:solidFill>
-                  <a:srgbClr val="00B0F0"/>
-                </a:solidFill>
-              </a:rPr>
-              <a:t>&amp;&amp;</a:t>
-            </a:r>
-            <a:endParaRPr>
-              <a:solidFill>
-                <a:srgbClr val="00B0F0"/>
-              </a:solidFill>
-            </a:endParaRPr>
-          </a:p>
-          <a:p>
-            <a:pPr marL="438912" indent="-320040" defTabSz="914400">
-              <a:spcBef>
-                <a:spcPts val="0"/>
-              </a:spcBef>
-              <a:buClr>
-                <a:srgbClr val="F0AD00"/>
-              </a:buClr>
-              <a:buSzPct val="80000"/>
-              <a:buFont typeface="Wingdings 2"/>
-              <a:buChar char="◼"/>
-              <a:defRPr sz="3200">
-                <a:latin typeface="Arial"/>
-                <a:ea typeface="Arial"/>
-                <a:cs typeface="Arial"/>
-                <a:sym typeface="Arial"/>
-              </a:defRPr>
-            </a:pPr>
-            <a:r>
-              <a:t>Conditional OR   </a:t>
-            </a:r>
-            <a:r>
-              <a:rPr>
-                <a:solidFill>
-                  <a:srgbClr val="00B0F0"/>
-                </a:solidFill>
-              </a:rPr>
-              <a:t>||                </a:t>
+            <a:pPr/>
+            <a:r>
+              <a:t>if, else, else if, switch, ?</a:t>
             </a:r>
           </a:p>
         </p:txBody>
       </p:sp>
-      <p:pic>
-        <p:nvPicPr>
-          <p:cNvPr id="153" name="image8.jpg" descr="1204_Logical Operators.jpg"/>
-          <p:cNvPicPr>
-            <a:picLocks noChangeAspect="1"/>
-          </p:cNvPicPr>
-          <p:nvPr/>
-        </p:nvPicPr>
-        <p:blipFill>
-          <a:blip r:embed="rId2">
-            <a:extLst/>
-          </a:blip>
-          <a:stretch>
-            <a:fillRect/>
-          </a:stretch>
-        </p:blipFill>
-        <p:spPr>
-          <a:xfrm>
-            <a:off x="1905000" y="4190999"/>
-            <a:ext cx="8745512" cy="4761447"/>
-          </a:xfrm>
-          <a:prstGeom prst="rect">
-            <a:avLst/>
-          </a:prstGeom>
-          <a:ln w="12700">
-            <a:miter lim="400000"/>
-          </a:ln>
-        </p:spPr>
-      </p:pic>
     </p:spTree>
   </p:cSld>
   <p:clrMapOvr>
@@ -5949,7 +5917,7 @@
       </p:grpSpPr>
       <p:sp>
         <p:nvSpPr>
-          <p:cNvPr id="155" name="Shape 155"/>
+          <p:cNvPr id="154" name="Shape 154"/>
           <p:cNvSpPr/>
           <p:nvPr>
             <p:ph type="title"/>
@@ -5962,18 +5930,22 @@
         </p:spPr>
         <p:txBody>
           <a:bodyPr/>
-          <a:lstStyle/>
+          <a:lstStyle>
+            <a:lvl1pPr defTabSz="490727">
+              <a:defRPr sz="6700"/>
+            </a:lvl1pPr>
+          </a:lstStyle>
           <a:p>
             <a:pPr/>
             <a:r>
-              <a:t>Arrays</a:t>
+              <a:t>Conditional Statements &amp; Unary Operator</a:t>
             </a:r>
           </a:p>
         </p:txBody>
       </p:sp>
       <p:sp>
         <p:nvSpPr>
-          <p:cNvPr id="156" name="Shape 156"/>
+          <p:cNvPr id="155" name="Shape 155"/>
           <p:cNvSpPr/>
           <p:nvPr>
             <p:ph type="body" idx="1"/>
@@ -5985,13 +5957,139 @@
           </a:prstGeom>
         </p:spPr>
         <p:txBody>
-          <a:bodyPr/>
+          <a:bodyPr anchor="t"/>
           <a:lstStyle/>
           <a:p>
-            <a:pPr/>
+            <a:pPr marL="438912" indent="-320040" defTabSz="914400">
+              <a:spcBef>
+                <a:spcPts val="0"/>
+              </a:spcBef>
+              <a:buClr>
+                <a:srgbClr val="F0AD00"/>
+              </a:buClr>
+              <a:buSzPct val="80000"/>
+              <a:buFont typeface="Wingdings 2"/>
+              <a:buChar char="◼"/>
+              <a:defRPr sz="3200">
+                <a:latin typeface="Arial"/>
+                <a:ea typeface="Arial"/>
+                <a:cs typeface="Arial"/>
+                <a:sym typeface="Arial"/>
+              </a:defRPr>
+            </a:pPr>
+            <a:r>
+              <a:t>Unary NOT operator  </a:t>
+            </a:r>
+            <a:r>
+              <a:rPr>
+                <a:solidFill>
+                  <a:srgbClr val="00B0F0"/>
+                </a:solidFill>
+              </a:rPr>
+              <a:t>!</a:t>
+            </a:r>
+            <a:endParaRPr>
+              <a:solidFill>
+                <a:srgbClr val="00B0F0"/>
+              </a:solidFill>
+            </a:endParaRPr>
+          </a:p>
+          <a:p>
+            <a:pPr marL="438912" indent="-320040" defTabSz="914400">
+              <a:spcBef>
+                <a:spcPts val="0"/>
+              </a:spcBef>
+              <a:buClr>
+                <a:srgbClr val="F0AD00"/>
+              </a:buClr>
+              <a:buSzPct val="80000"/>
+              <a:buFont typeface="Wingdings 2"/>
+              <a:buChar char="◼"/>
+              <a:defRPr sz="3200">
+                <a:latin typeface="Arial"/>
+                <a:ea typeface="Arial"/>
+                <a:cs typeface="Arial"/>
+                <a:sym typeface="Arial"/>
+              </a:defRPr>
+            </a:pPr>
+            <a:r>
+              <a:t>Conditional AND  </a:t>
+            </a:r>
+            <a:r>
+              <a:rPr>
+                <a:solidFill>
+                  <a:srgbClr val="00B0F0"/>
+                </a:solidFill>
+              </a:rPr>
+              <a:t>&amp;&amp;</a:t>
+            </a:r>
+            <a:endParaRPr>
+              <a:solidFill>
+                <a:srgbClr val="00B0F0"/>
+              </a:solidFill>
+            </a:endParaRPr>
+          </a:p>
+          <a:p>
+            <a:pPr marL="438912" indent="-320040" defTabSz="914400">
+              <a:spcBef>
+                <a:spcPts val="0"/>
+              </a:spcBef>
+              <a:buClr>
+                <a:srgbClr val="F0AD00"/>
+              </a:buClr>
+              <a:buSzPct val="80000"/>
+              <a:buFont typeface="Wingdings 2"/>
+              <a:buChar char="◼"/>
+              <a:defRPr sz="3200">
+                <a:latin typeface="Arial"/>
+                <a:ea typeface="Arial"/>
+                <a:cs typeface="Arial"/>
+                <a:sym typeface="Arial"/>
+              </a:defRPr>
+            </a:pPr>
+            <a:r>
+              <a:t>Conditional OR   </a:t>
+            </a:r>
+            <a:r>
+              <a:rPr>
+                <a:solidFill>
+                  <a:srgbClr val="00B0F0"/>
+                </a:solidFill>
+              </a:rPr>
+              <a:t>||                </a:t>
+            </a:r>
           </a:p>
         </p:txBody>
       </p:sp>
+      <p:pic>
+        <p:nvPicPr>
+          <p:cNvPr id="156" name="image1.jpeg" descr="1204_Logical Operators.jpg"/>
+          <p:cNvPicPr>
+            <a:picLocks noChangeAspect="1"/>
+          </p:cNvPicPr>
+          <p:nvPr/>
+        </p:nvPicPr>
+        <p:blipFill>
+          <a:blip r:embed="rId2">
+            <a:extLst/>
+          </a:blip>
+          <a:stretch>
+            <a:fillRect/>
+          </a:stretch>
+        </p:blipFill>
+        <p:spPr>
+          <a:xfrm>
+            <a:off x="1905000" y="4190998"/>
+            <a:ext cx="8745512" cy="4761449"/>
+          </a:xfrm>
+          <a:prstGeom prst="rect">
+            <a:avLst/>
+          </a:prstGeom>
+          <a:ln w="12700">
+            <a:miter lim="400000"/>
+          </a:ln>
+        </p:spPr>
+      </p:pic>
     </p:spTree>
   </p:cSld>
   <p:clrMapOvr>
@@ -6012,10 +6110,10 @@
         <a:srgbClr val="FFFFFF"/>
       </a:lt1>
       <a:dk2>
-        <a:srgbClr val="53585F"/>
+        <a:srgbClr val="A7A7A7"/>
       </a:dk2>
       <a:lt2>
-        <a:srgbClr val="DCDEE0"/>
+        <a:srgbClr val="535353"/>
       </a:lt2>
       <a:accent1>
         <a:srgbClr val="0365C0"/>
@@ -6044,14 +6142,14 @@
     </a:clrScheme>
     <a:fontScheme name="White">
       <a:majorFont>
-        <a:latin typeface="Helvetica Light"/>
-        <a:ea typeface="Helvetica Light"/>
-        <a:cs typeface="Helvetica Light"/>
+        <a:latin typeface="Helvetica Neue"/>
+        <a:ea typeface="Helvetica Neue"/>
+        <a:cs typeface="Helvetica Neue"/>
       </a:majorFont>
       <a:minorFont>
-        <a:latin typeface="Helvetica Light"/>
-        <a:ea typeface="Helvetica Light"/>
-        <a:cs typeface="Helvetica Light"/>
+        <a:latin typeface="Helvetica"/>
+        <a:ea typeface="Helvetica"/>
+        <a:cs typeface="Helvetica"/>
       </a:minorFont>
     </a:fontScheme>
     <a:fmtScheme name="White">
@@ -6137,7 +6235,7 @@
         </a:effectStyle>
         <a:effectStyle>
           <a:effectLst>
-            <a:outerShdw sx="100000" sy="100000" kx="0" ky="0" algn="b" rotWithShape="0" blurRad="50800" dist="12700" dir="0">
+            <a:outerShdw sx="100000" sy="100000" kx="0" ky="0" algn="b" rotWithShape="0" blurRad="38100" dist="25400" dir="5400000">
               <a:srgbClr val="000000">
                 <a:alpha val="50000"/>
               </a:srgbClr>
@@ -6209,14 +6307,15 @@
   <a:objectDefaults>
     <a:spDef>
       <a:spPr>
-        <a:blipFill rotWithShape="1">
-          <a:blip r:embed="rId1"/>
-          <a:srcRect l="0" t="0" r="0" b="0"/>
-          <a:tile tx="0" ty="0" sx="100000" sy="100000" flip="none" algn="tl"/>
-        </a:blipFill>
-        <a:ln w="12700" cap="flat">
-          <a:noFill/>
-          <a:miter lim="400000"/>
+        <a:solidFill>
+          <a:srgbClr val="FFFFFF"/>
+        </a:solidFill>
+        <a:ln w="25400" cap="flat">
+          <a:solidFill>
+            <a:schemeClr val="accent1"/>
+          </a:solidFill>
+          <a:prstDash val="solid"/>
+          <a:round/>
         </a:ln>
         <a:effectLst>
           <a:outerShdw sx="100000" sy="100000" kx="0" ky="0" algn="b" rotWithShape="0" blurRad="38100" dist="25400" dir="5400000">
@@ -6246,19 +6345,19 @@
           <a:buFontTx/>
           <a:buNone/>
           <a:tabLst/>
-          <a:defRPr b="0" baseline="0" cap="none" i="0" spc="0" strike="noStrike" sz="2400" u="none" kumimoji="0" normalizeH="0">
+          <a:defRPr b="0" baseline="0" cap="none" i="0" spc="0" strike="noStrike" sz="3600" u="none" kumimoji="0" normalizeH="0">
             <a:ln>
               <a:noFill/>
             </a:ln>
             <a:solidFill>
-              <a:srgbClr val="FFFFFF"/>
+              <a:srgbClr val="000000"/>
             </a:solidFill>
             <a:effectLst/>
             <a:uFillTx/>
-            <a:latin typeface="+mn-lt"/>
-            <a:ea typeface="+mn-ea"/>
-            <a:cs typeface="+mn-cs"/>
-            <a:sym typeface="Helvetica Light"/>
+            <a:latin typeface="+mj-lt"/>
+            <a:ea typeface="+mj-ea"/>
+            <a:cs typeface="+mj-cs"/>
+            <a:sym typeface="Helvetica Neue"/>
           </a:defRPr>
         </a:defPPr>
         <a:lvl1pPr marL="0" marR="0" indent="0" algn="l" defTabSz="914400" rtl="0" fontAlgn="auto" latinLnBrk="1" hangingPunct="0">
@@ -6508,12 +6607,18 @@
         <a:noFill/>
         <a:ln w="25400" cap="flat">
           <a:solidFill>
-            <a:srgbClr val="000000"/>
+            <a:schemeClr val="accent1"/>
           </a:solidFill>
           <a:prstDash val="solid"/>
-          <a:miter lim="400000"/>
+          <a:round/>
         </a:ln>
-        <a:effectLst/>
+        <a:effectLst>
+          <a:outerShdw sx="100000" sy="100000" kx="0" ky="0" algn="b" rotWithShape="0" blurRad="38100" dist="25400" dir="5400000">
+            <a:srgbClr val="000000">
+              <a:alpha val="50000"/>
+            </a:srgbClr>
+          </a:outerShdw>
+        </a:effectLst>
         <a:sp3d/>
       </a:spPr>
       <a:bodyPr rot="0" spcFirstLastPara="1" vertOverflow="overflow" horzOverflow="overflow" vert="horz" wrap="square" lIns="91439" tIns="45719" rIns="91439" bIns="45719" numCol="1" spcCol="38100" rtlCol="0" anchor="t" upright="0">
@@ -6826,10 +6931,10 @@
             </a:solidFill>
             <a:effectLst/>
             <a:uFillTx/>
-            <a:latin typeface="+mn-lt"/>
-            <a:ea typeface="+mn-ea"/>
-            <a:cs typeface="+mn-cs"/>
-            <a:sym typeface="Helvetica Light"/>
+            <a:latin typeface="+mj-lt"/>
+            <a:ea typeface="+mj-ea"/>
+            <a:cs typeface="+mj-cs"/>
+            <a:sym typeface="Helvetica Neue"/>
           </a:defRPr>
         </a:defPPr>
         <a:lvl1pPr marL="0" marR="0" indent="0" algn="l" defTabSz="914400" rtl="0" fontAlgn="auto" latinLnBrk="1" hangingPunct="0">
@@ -7089,10 +7194,10 @@
         <a:srgbClr val="FFFFFF"/>
       </a:lt1>
       <a:dk2>
-        <a:srgbClr val="53585F"/>
+        <a:srgbClr val="A7A7A7"/>
       </a:dk2>
       <a:lt2>
-        <a:srgbClr val="DCDEE0"/>
+        <a:srgbClr val="535353"/>
       </a:lt2>
       <a:accent1>
         <a:srgbClr val="0365C0"/>
@@ -7121,14 +7226,14 @@
     </a:clrScheme>
     <a:fontScheme name="White">
       <a:majorFont>
-        <a:latin typeface="Helvetica Light"/>
-        <a:ea typeface="Helvetica Light"/>
-        <a:cs typeface="Helvetica Light"/>
+        <a:latin typeface="Helvetica Neue"/>
+        <a:ea typeface="Helvetica Neue"/>
+        <a:cs typeface="Helvetica Neue"/>
       </a:majorFont>
       <a:minorFont>
-        <a:latin typeface="Helvetica Light"/>
-        <a:ea typeface="Helvetica Light"/>
-        <a:cs typeface="Helvetica Light"/>
+        <a:latin typeface="Helvetica"/>
+        <a:ea typeface="Helvetica"/>
+        <a:cs typeface="Helvetica"/>
       </a:minorFont>
     </a:fontScheme>
     <a:fmtScheme name="White">
@@ -7214,7 +7319,7 @@
         </a:effectStyle>
         <a:effectStyle>
           <a:effectLst>
-            <a:outerShdw sx="100000" sy="100000" kx="0" ky="0" algn="b" rotWithShape="0" blurRad="50800" dist="12700" dir="0">
+            <a:outerShdw sx="100000" sy="100000" kx="0" ky="0" algn="b" rotWithShape="0" blurRad="38100" dist="25400" dir="5400000">
               <a:srgbClr val="000000">
                 <a:alpha val="50000"/>
               </a:srgbClr>
@@ -7286,14 +7391,15 @@
   <a:objectDefaults>
     <a:spDef>
       <a:spPr>
-        <a:blipFill rotWithShape="1">
-          <a:blip r:embed="rId1"/>
-          <a:srcRect l="0" t="0" r="0" b="0"/>
-          <a:tile tx="0" ty="0" sx="100000" sy="100000" flip="none" algn="tl"/>
-        </a:blipFill>
-        <a:ln w="12700" cap="flat">
-          <a:noFill/>
-          <a:miter lim="400000"/>
+        <a:solidFill>
+          <a:srgbClr val="FFFFFF"/>
+        </a:solidFill>
+        <a:ln w="25400" cap="flat">
+          <a:solidFill>
+            <a:schemeClr val="accent1"/>
+          </a:solidFill>
+          <a:prstDash val="solid"/>
+          <a:round/>
         </a:ln>
         <a:effectLst>
           <a:outerShdw sx="100000" sy="100000" kx="0" ky="0" algn="b" rotWithShape="0" blurRad="38100" dist="25400" dir="5400000">
@@ -7323,19 +7429,19 @@
           <a:buFontTx/>
           <a:buNone/>
           <a:tabLst/>
-          <a:defRPr b="0" baseline="0" cap="none" i="0" spc="0" strike="noStrike" sz="2400" u="none" kumimoji="0" normalizeH="0">
+          <a:defRPr b="0" baseline="0" cap="none" i="0" spc="0" strike="noStrike" sz="3600" u="none" kumimoji="0" normalizeH="0">
             <a:ln>
               <a:noFill/>
             </a:ln>
             <a:solidFill>
-              <a:srgbClr val="FFFFFF"/>
+              <a:srgbClr val="000000"/>
             </a:solidFill>
             <a:effectLst/>
             <a:uFillTx/>
-            <a:latin typeface="+mn-lt"/>
-            <a:ea typeface="+mn-ea"/>
-            <a:cs typeface="+mn-cs"/>
-            <a:sym typeface="Helvetica Light"/>
+            <a:latin typeface="+mj-lt"/>
+            <a:ea typeface="+mj-ea"/>
+            <a:cs typeface="+mj-cs"/>
+            <a:sym typeface="Helvetica Neue"/>
           </a:defRPr>
         </a:defPPr>
         <a:lvl1pPr marL="0" marR="0" indent="0" algn="l" defTabSz="914400" rtl="0" fontAlgn="auto" latinLnBrk="1" hangingPunct="0">
@@ -7585,12 +7691,18 @@
         <a:noFill/>
         <a:ln w="25400" cap="flat">
           <a:solidFill>
-            <a:srgbClr val="000000"/>
+            <a:schemeClr val="accent1"/>
           </a:solidFill>
           <a:prstDash val="solid"/>
-          <a:miter lim="400000"/>
+          <a:round/>
         </a:ln>
-        <a:effectLst/>
+        <a:effectLst>
+          <a:outerShdw sx="100000" sy="100000" kx="0" ky="0" algn="b" rotWithShape="0" blurRad="38100" dist="25400" dir="5400000">
+            <a:srgbClr val="000000">
+              <a:alpha val="50000"/>
+            </a:srgbClr>
+          </a:outerShdw>
+        </a:effectLst>
         <a:sp3d/>
       </a:spPr>
       <a:bodyPr rot="0" spcFirstLastPara="1" vertOverflow="overflow" horzOverflow="overflow" vert="horz" wrap="square" lIns="91439" tIns="45719" rIns="91439" bIns="45719" numCol="1" spcCol="38100" rtlCol="0" anchor="t" upright="0">
@@ -7903,10 +8015,10 @@
             </a:solidFill>
             <a:effectLst/>
             <a:uFillTx/>
-            <a:latin typeface="+mn-lt"/>
-            <a:ea typeface="+mn-ea"/>
-            <a:cs typeface="+mn-cs"/>
-            <a:sym typeface="Helvetica Light"/>
+            <a:latin typeface="+mj-lt"/>
+            <a:ea typeface="+mj-ea"/>
+            <a:cs typeface="+mj-cs"/>
+            <a:sym typeface="Helvetica Neue"/>
           </a:defRPr>
         </a:defPPr>
         <a:lvl1pPr marL="0" marR="0" indent="0" algn="l" defTabSz="914400" rtl="0" fontAlgn="auto" latinLnBrk="1" hangingPunct="0">

</xml_diff>